<commit_message>
Tips and FAQ edited
In corporating Al's edits to tips and FAQ.
</commit_message>
<xml_diff>
--- a/lohse ACRM 2017 tips.pptx
+++ b/lohse ACRM 2017 tips.pptx
@@ -5,18 +5,22 @@
     <p:sldMasterId id="2147483648" r:id="rId1"/>
   </p:sldMasterIdLst>
   <p:notesMasterIdLst>
-    <p:notesMasterId r:id="rId11"/>
+    <p:notesMasterId r:id="rId15"/>
   </p:notesMasterIdLst>
   <p:sldIdLst>
     <p:sldId id="256" r:id="rId2"/>
     <p:sldId id="257" r:id="rId3"/>
     <p:sldId id="258" r:id="rId4"/>
-    <p:sldId id="259" r:id="rId5"/>
-    <p:sldId id="260" r:id="rId6"/>
-    <p:sldId id="261" r:id="rId7"/>
-    <p:sldId id="262" r:id="rId8"/>
-    <p:sldId id="265" r:id="rId9"/>
-    <p:sldId id="264" r:id="rId10"/>
+    <p:sldId id="270" r:id="rId5"/>
+    <p:sldId id="269" r:id="rId6"/>
+    <p:sldId id="259" r:id="rId7"/>
+    <p:sldId id="260" r:id="rId8"/>
+    <p:sldId id="261" r:id="rId9"/>
+    <p:sldId id="262" r:id="rId10"/>
+    <p:sldId id="265" r:id="rId11"/>
+    <p:sldId id="268" r:id="rId12"/>
+    <p:sldId id="264" r:id="rId13"/>
+    <p:sldId id="271" r:id="rId14"/>
   </p:sldIdLst>
   <p:sldSz cx="12192000" cy="6858000"/>
   <p:notesSz cx="6858000" cy="9144000"/>
@@ -3617,6 +3621,1434 @@
 </p:sld>
 </file>
 
+<file path=ppt/slides/slide10.xml><?xml version="1.0" encoding="utf-8"?>
+<p:sld xmlns:a="http://schemas.openxmlformats.org/drawingml/2006/main" xmlns:r="http://schemas.openxmlformats.org/officeDocument/2006/relationships" xmlns:p="http://schemas.openxmlformats.org/presentationml/2006/main">
+  <p:cSld>
+    <p:spTree>
+      <p:nvGrpSpPr>
+        <p:cNvPr id="1" name=""/>
+        <p:cNvGrpSpPr/>
+        <p:nvPr/>
+      </p:nvGrpSpPr>
+      <p:grpSpPr>
+        <a:xfrm>
+          <a:off x="0" y="0"/>
+          <a:ext cx="0" cy="0"/>
+          <a:chOff x="0" y="0"/>
+          <a:chExt cx="0" cy="0"/>
+        </a:xfrm>
+      </p:grpSpPr>
+      <p:sp>
+        <p:nvSpPr>
+          <p:cNvPr id="2" name="Title 1"/>
+          <p:cNvSpPr>
+            <a:spLocks noGrp="1"/>
+          </p:cNvSpPr>
+          <p:nvPr>
+            <p:ph type="title"/>
+          </p:nvPr>
+        </p:nvSpPr>
+        <p:spPr/>
+        <p:txBody>
+          <a:bodyPr/>
+          <a:lstStyle/>
+          <a:p>
+            <a:r>
+              <a:rPr lang="en-US" dirty="0"/>
+              <a:t>9</a:t>
+            </a:r>
+            <a:r>
+              <a:rPr lang="en-US" dirty="0" smtClean="0"/>
+              <a:t>. </a:t>
+            </a:r>
+            <a:r>
+              <a:rPr lang="en-US" dirty="0" smtClean="0"/>
+              <a:t>What are Fixed-Effects and Random-Effects?</a:t>
+            </a:r>
+            <a:endParaRPr lang="en-US" dirty="0"/>
+          </a:p>
+        </p:txBody>
+      </p:sp>
+      <p:sp>
+        <p:nvSpPr>
+          <p:cNvPr id="4" name="Slide Number Placeholder 3"/>
+          <p:cNvSpPr>
+            <a:spLocks noGrp="1"/>
+          </p:cNvSpPr>
+          <p:nvPr>
+            <p:ph type="sldNum" sz="quarter" idx="12"/>
+          </p:nvPr>
+        </p:nvSpPr>
+        <p:spPr/>
+        <p:txBody>
+          <a:bodyPr/>
+          <a:lstStyle/>
+          <a:p>
+            <a:fld id="{62D33721-DFD7-43E1-85F9-9FD0AD2C3B28}" type="slidenum">
+              <a:rPr lang="en-US" smtClean="0"/>
+              <a:t>10</a:t>
+            </a:fld>
+            <a:endParaRPr lang="en-US"/>
+          </a:p>
+        </p:txBody>
+      </p:sp>
+      <mc:AlternateContent xmlns:mc="http://schemas.openxmlformats.org/markup-compatibility/2006" xmlns:a14="http://schemas.microsoft.com/office/drawing/2010/main">
+        <mc:Choice Requires="a14">
+          <p:sp>
+            <p:nvSpPr>
+              <p:cNvPr id="6" name="Rectangle 5"/>
+              <p:cNvSpPr/>
+              <p:nvPr/>
+            </p:nvSpPr>
+            <p:spPr>
+              <a:xfrm>
+                <a:off x="3333664" y="2369408"/>
+                <a:ext cx="6159378" cy="491417"/>
+              </a:xfrm>
+              <a:prstGeom prst="rect">
+                <a:avLst/>
+              </a:prstGeom>
+            </p:spPr>
+            <p:txBody>
+              <a:bodyPr wrap="none">
+                <a:spAutoFit/>
+              </a:bodyPr>
+              <a:lstStyle/>
+              <a:p>
+                <a:pPr/>
+                <a14:m>
+                  <m:oMathPara xmlns:m="http://schemas.openxmlformats.org/officeDocument/2006/math">
+                    <m:oMathParaPr>
+                      <m:jc m:val="centerGroup"/>
+                    </m:oMathParaPr>
+                    <m:oMath xmlns:m="http://schemas.openxmlformats.org/officeDocument/2006/math">
+                      <m:sSub>
+                        <m:sSubPr>
+                          <m:ctrlPr>
+                            <a:rPr lang="en-US" sz="2400" i="1">
+                              <a:latin typeface="Cambria Math" panose="02040503050406030204" pitchFamily="18" charset="0"/>
+                            </a:rPr>
+                          </m:ctrlPr>
+                        </m:sSubPr>
+                        <m:e>
+                          <m:r>
+                            <a:rPr lang="en-US" sz="2400" i="1">
+                              <a:latin typeface="Cambria Math" panose="02040503050406030204" pitchFamily="18" charset="0"/>
+                            </a:rPr>
+                            <m:t>𝑦</m:t>
+                          </m:r>
+                        </m:e>
+                        <m:sub>
+                          <m:r>
+                            <a:rPr lang="en-US" sz="2400" i="1">
+                              <a:latin typeface="Cambria Math" panose="02040503050406030204" pitchFamily="18" charset="0"/>
+                            </a:rPr>
+                            <m:t>𝑖𝑗</m:t>
+                          </m:r>
+                        </m:sub>
+                      </m:sSub>
+                      <m:r>
+                        <a:rPr lang="en-US" sz="2400" i="0">
+                          <a:latin typeface="Cambria Math" panose="02040503050406030204" pitchFamily="18" charset="0"/>
+                        </a:rPr>
+                        <m:t>=</m:t>
+                      </m:r>
+                      <m:sSub>
+                        <m:sSubPr>
+                          <m:ctrlPr>
+                            <a:rPr lang="en-US" sz="2400" i="1">
+                              <a:latin typeface="Cambria Math" panose="02040503050406030204" pitchFamily="18" charset="0"/>
+                            </a:rPr>
+                          </m:ctrlPr>
+                        </m:sSubPr>
+                        <m:e>
+                          <m:r>
+                            <a:rPr lang="en-US" sz="2400" i="1">
+                              <a:latin typeface="Cambria Math" panose="02040503050406030204" pitchFamily="18" charset="0"/>
+                            </a:rPr>
+                            <m:t>𝐵</m:t>
+                          </m:r>
+                        </m:e>
+                        <m:sub>
+                          <m:r>
+                            <a:rPr lang="en-US" sz="2400" i="0">
+                              <a:latin typeface="Cambria Math" panose="02040503050406030204" pitchFamily="18" charset="0"/>
+                            </a:rPr>
+                            <m:t>0</m:t>
+                          </m:r>
+                        </m:sub>
+                      </m:sSub>
+                      <m:r>
+                        <a:rPr lang="en-US" sz="2400" i="0">
+                          <a:latin typeface="Cambria Math" panose="02040503050406030204" pitchFamily="18" charset="0"/>
+                        </a:rPr>
+                        <m:t>+</m:t>
+                      </m:r>
+                      <m:sSub>
+                        <m:sSubPr>
+                          <m:ctrlPr>
+                            <a:rPr lang="en-US" sz="2400" i="1">
+                              <a:latin typeface="Cambria Math" panose="02040503050406030204" pitchFamily="18" charset="0"/>
+                            </a:rPr>
+                          </m:ctrlPr>
+                        </m:sSubPr>
+                        <m:e>
+                          <m:r>
+                            <a:rPr lang="en-US" sz="2400" i="1">
+                              <a:latin typeface="Cambria Math" panose="02040503050406030204" pitchFamily="18" charset="0"/>
+                            </a:rPr>
+                            <m:t>𝑈</m:t>
+                          </m:r>
+                        </m:e>
+                        <m:sub>
+                          <m:r>
+                            <a:rPr lang="en-US" sz="2400" i="0">
+                              <a:latin typeface="Cambria Math" panose="02040503050406030204" pitchFamily="18" charset="0"/>
+                            </a:rPr>
+                            <m:t>0</m:t>
+                          </m:r>
+                          <m:r>
+                            <a:rPr lang="en-US" sz="2400" i="1">
+                              <a:latin typeface="Cambria Math" panose="02040503050406030204" pitchFamily="18" charset="0"/>
+                            </a:rPr>
+                            <m:t>𝑗</m:t>
+                          </m:r>
+                        </m:sub>
+                      </m:sSub>
+                      <m:r>
+                        <a:rPr lang="en-US" sz="2400" i="0">
+                          <a:latin typeface="Cambria Math" panose="02040503050406030204" pitchFamily="18" charset="0"/>
+                        </a:rPr>
+                        <m:t>+(</m:t>
+                      </m:r>
+                      <m:sSub>
+                        <m:sSubPr>
+                          <m:ctrlPr>
+                            <a:rPr lang="en-US" sz="2400" i="1">
+                              <a:latin typeface="Cambria Math" panose="02040503050406030204" pitchFamily="18" charset="0"/>
+                            </a:rPr>
+                          </m:ctrlPr>
+                        </m:sSubPr>
+                        <m:e>
+                          <m:r>
+                            <a:rPr lang="en-US" sz="2400" i="1">
+                              <a:latin typeface="Cambria Math" panose="02040503050406030204" pitchFamily="18" charset="0"/>
+                            </a:rPr>
+                            <m:t>𝐵</m:t>
+                          </m:r>
+                        </m:e>
+                        <m:sub>
+                          <m:r>
+                            <a:rPr lang="en-US" sz="2400" i="0">
+                              <a:latin typeface="Cambria Math" panose="02040503050406030204" pitchFamily="18" charset="0"/>
+                            </a:rPr>
+                            <m:t>1</m:t>
+                          </m:r>
+                        </m:sub>
+                      </m:sSub>
+                      <m:r>
+                        <a:rPr lang="en-US" sz="2400" i="0">
+                          <a:latin typeface="Cambria Math" panose="02040503050406030204" pitchFamily="18" charset="0"/>
+                        </a:rPr>
+                        <m:t>+</m:t>
+                      </m:r>
+                      <m:sSub>
+                        <m:sSubPr>
+                          <m:ctrlPr>
+                            <a:rPr lang="en-US" sz="2400" i="1">
+                              <a:latin typeface="Cambria Math" panose="02040503050406030204" pitchFamily="18" charset="0"/>
+                            </a:rPr>
+                          </m:ctrlPr>
+                        </m:sSubPr>
+                        <m:e>
+                          <m:r>
+                            <a:rPr lang="en-US" sz="2400" i="1">
+                              <a:latin typeface="Cambria Math" panose="02040503050406030204" pitchFamily="18" charset="0"/>
+                            </a:rPr>
+                            <m:t>𝑈</m:t>
+                          </m:r>
+                        </m:e>
+                        <m:sub>
+                          <m:r>
+                            <a:rPr lang="en-US" sz="2400" i="0">
+                              <a:latin typeface="Cambria Math" panose="02040503050406030204" pitchFamily="18" charset="0"/>
+                            </a:rPr>
+                            <m:t>1</m:t>
+                          </m:r>
+                          <m:r>
+                            <a:rPr lang="en-US" sz="2400" i="1">
+                              <a:latin typeface="Cambria Math" panose="02040503050406030204" pitchFamily="18" charset="0"/>
+                            </a:rPr>
+                            <m:t>𝑗</m:t>
+                          </m:r>
+                        </m:sub>
+                      </m:sSub>
+                      <m:r>
+                        <a:rPr lang="en-US" sz="2400" i="0">
+                          <a:latin typeface="Cambria Math" panose="02040503050406030204" pitchFamily="18" charset="0"/>
+                        </a:rPr>
+                        <m:t>)∗(</m:t>
+                      </m:r>
+                      <m:r>
+                        <a:rPr lang="en-US" sz="2400" i="1">
+                          <a:latin typeface="Cambria Math" panose="02040503050406030204" pitchFamily="18" charset="0"/>
+                        </a:rPr>
+                        <m:t>𝑇𝐼𝑀</m:t>
+                      </m:r>
+                      <m:sSub>
+                        <m:sSubPr>
+                          <m:ctrlPr>
+                            <a:rPr lang="en-US" sz="2400" i="1">
+                              <a:latin typeface="Cambria Math" panose="02040503050406030204" pitchFamily="18" charset="0"/>
+                            </a:rPr>
+                          </m:ctrlPr>
+                        </m:sSubPr>
+                        <m:e>
+                          <m:r>
+                            <a:rPr lang="en-US" sz="2400" i="1">
+                              <a:latin typeface="Cambria Math" panose="02040503050406030204" pitchFamily="18" charset="0"/>
+                            </a:rPr>
+                            <m:t>𝐸</m:t>
+                          </m:r>
+                        </m:e>
+                        <m:sub>
+                          <m:r>
+                            <a:rPr lang="en-US" sz="2400" i="1">
+                              <a:latin typeface="Cambria Math" panose="02040503050406030204" pitchFamily="18" charset="0"/>
+                            </a:rPr>
+                            <m:t>𝑖𝑗</m:t>
+                          </m:r>
+                        </m:sub>
+                      </m:sSub>
+                      <m:r>
+                        <a:rPr lang="en-US" sz="2400" i="0">
+                          <a:latin typeface="Cambria Math" panose="02040503050406030204" pitchFamily="18" charset="0"/>
+                        </a:rPr>
+                        <m:t>)+</m:t>
+                      </m:r>
+                      <m:sSub>
+                        <m:sSubPr>
+                          <m:ctrlPr>
+                            <a:rPr lang="en-US" sz="2400" i="1">
+                              <a:latin typeface="Cambria Math" panose="02040503050406030204" pitchFamily="18" charset="0"/>
+                            </a:rPr>
+                          </m:ctrlPr>
+                        </m:sSubPr>
+                        <m:e>
+                          <m:r>
+                            <a:rPr lang="en-US" sz="2400" i="1" smtClean="0">
+                              <a:latin typeface="Cambria Math" panose="02040503050406030204" pitchFamily="18" charset="0"/>
+                              <a:ea typeface="Cambria Math" panose="02040503050406030204" pitchFamily="18" charset="0"/>
+                            </a:rPr>
+                            <m:t>𝜖</m:t>
+                          </m:r>
+                        </m:e>
+                        <m:sub>
+                          <m:r>
+                            <a:rPr lang="en-US" sz="2400" i="1">
+                              <a:latin typeface="Cambria Math" panose="02040503050406030204" pitchFamily="18" charset="0"/>
+                            </a:rPr>
+                            <m:t>𝑖𝑗</m:t>
+                          </m:r>
+                        </m:sub>
+                      </m:sSub>
+                    </m:oMath>
+                  </m:oMathPara>
+                </a14:m>
+                <a:endParaRPr lang="en-US" sz="2400" dirty="0"/>
+              </a:p>
+            </p:txBody>
+          </p:sp>
+        </mc:Choice>
+        <mc:Fallback xmlns="">
+          <p:sp>
+            <p:nvSpPr>
+              <p:cNvPr id="6" name="Rectangle 5"/>
+              <p:cNvSpPr>
+                <a:spLocks noRot="1" noChangeAspect="1" noMove="1" noResize="1" noEditPoints="1" noAdjustHandles="1" noChangeArrowheads="1" noChangeShapeType="1" noTextEdit="1"/>
+              </p:cNvSpPr>
+              <p:nvPr/>
+            </p:nvSpPr>
+            <p:spPr>
+              <a:xfrm>
+                <a:off x="3333664" y="2369408"/>
+                <a:ext cx="6159378" cy="491417"/>
+              </a:xfrm>
+              <a:prstGeom prst="rect">
+                <a:avLst/>
+              </a:prstGeom>
+              <a:blipFill>
+                <a:blip r:embed="rId2"/>
+                <a:stretch>
+                  <a:fillRect b="-12500"/>
+                </a:stretch>
+              </a:blipFill>
+            </p:spPr>
+            <p:txBody>
+              <a:bodyPr/>
+              <a:lstStyle/>
+              <a:p>
+                <a:r>
+                  <a:rPr lang="en-US">
+                    <a:noFill/>
+                  </a:rPr>
+                  <a:t> </a:t>
+                </a:r>
+              </a:p>
+            </p:txBody>
+          </p:sp>
+        </mc:Fallback>
+      </mc:AlternateContent>
+      <mc:AlternateContent xmlns:mc="http://schemas.openxmlformats.org/markup-compatibility/2006" xmlns:a14="http://schemas.microsoft.com/office/drawing/2010/main">
+        <mc:Choice Requires="a14">
+          <p:sp>
+            <p:nvSpPr>
+              <p:cNvPr id="7" name="TextBox 6"/>
+              <p:cNvSpPr txBox="1"/>
+              <p:nvPr/>
+            </p:nvSpPr>
+            <p:spPr>
+              <a:xfrm>
+                <a:off x="838200" y="3077738"/>
+                <a:ext cx="10515599" cy="3568477"/>
+              </a:xfrm>
+              <a:prstGeom prst="rect">
+                <a:avLst/>
+              </a:prstGeom>
+              <a:noFill/>
+            </p:spPr>
+            <p:txBody>
+              <a:bodyPr wrap="square" rtlCol="0">
+                <a:spAutoFit/>
+              </a:bodyPr>
+              <a:lstStyle/>
+              <a:p>
+                <a:r>
+                  <a:rPr lang="en-US" sz="2400" dirty="0" smtClean="0"/>
+                  <a:t>Thus, we </a:t>
+                </a:r>
+                <a:r>
+                  <a:rPr lang="en-US" sz="2400" dirty="0"/>
+                  <a:t>have the following terms in our </a:t>
+                </a:r>
+                <a:r>
+                  <a:rPr lang="en-US" sz="2400" i="1" dirty="0" smtClean="0"/>
+                  <a:t>DATA</a:t>
+                </a:r>
+                <a:r>
+                  <a:rPr lang="en-US" sz="2400" dirty="0" smtClean="0"/>
+                  <a:t> (</a:t>
+                </a:r>
+                <a:r>
+                  <a:rPr lang="en-US" sz="2400" dirty="0" err="1" smtClean="0"/>
+                  <a:t>y</a:t>
+                </a:r>
+                <a:r>
+                  <a:rPr lang="en-US" sz="2400" baseline="-25000" dirty="0" err="1" smtClean="0"/>
+                  <a:t>ij</a:t>
+                </a:r>
+                <a:r>
+                  <a:rPr lang="en-US" sz="2400" dirty="0" err="1" smtClean="0"/>
+                  <a:t>’s</a:t>
+                </a:r>
+                <a:r>
+                  <a:rPr lang="en-US" sz="2400" dirty="0" smtClean="0"/>
+                  <a:t>):</a:t>
+                </a:r>
+                <a:endParaRPr lang="en-US" sz="2400" dirty="0"/>
+              </a:p>
+              <a:p>
+                <a:pPr marL="285750" lvl="0" indent="-285750">
+                  <a:buFont typeface="Arial" panose="020B0604020202020204" pitchFamily="34" charset="0"/>
+                  <a:buChar char="•"/>
+                </a:pPr>
+                <a:r>
+                  <a:rPr lang="en-US" sz="2000" dirty="0"/>
+                  <a:t>The </a:t>
+                </a:r>
+                <a:r>
+                  <a:rPr lang="en-US" sz="2000" i="1" dirty="0"/>
+                  <a:t>MODEL</a:t>
+                </a:r>
+                <a:r>
+                  <a:rPr lang="en-US" sz="2000" dirty="0"/>
+                  <a:t> includes fixed effects and random effects.</a:t>
+                </a:r>
+              </a:p>
+              <a:p>
+                <a:pPr marL="285750" lvl="0" indent="-285750">
+                  <a:buFont typeface="Arial" panose="020B0604020202020204" pitchFamily="34" charset="0"/>
+                  <a:buChar char="•"/>
+                </a:pPr>
+                <a:r>
+                  <a:rPr lang="en-US" sz="2000" b="1" i="1" dirty="0"/>
+                  <a:t>Fixed-Effects</a:t>
+                </a:r>
+                <a:r>
+                  <a:rPr lang="en-US" sz="2000" dirty="0"/>
+                  <a:t> are the group-level </a:t>
+                </a:r>
+                <a14:m>
+                  <m:oMath xmlns:m="http://schemas.openxmlformats.org/officeDocument/2006/math">
+                    <m:r>
+                      <a:rPr lang="en-US" sz="2000" i="1">
+                        <a:latin typeface="Cambria Math" panose="02040503050406030204" pitchFamily="18" charset="0"/>
+                      </a:rPr>
+                      <m:t>𝐵</m:t>
+                    </m:r>
+                  </m:oMath>
+                </a14:m>
+                <a:r>
+                  <a:rPr lang="en-US" sz="2000" dirty="0"/>
+                  <a:t>'s, these effects parallel the traditional main-effects and interactions that you have probably encountered in other statistical analyses.</a:t>
+                </a:r>
+              </a:p>
+              <a:p>
+                <a:pPr marL="285750" lvl="0" indent="-285750">
+                  <a:buFont typeface="Arial" panose="020B0604020202020204" pitchFamily="34" charset="0"/>
+                  <a:buChar char="•"/>
+                </a:pPr>
+                <a:r>
+                  <a:rPr lang="en-US" sz="2000" b="1" i="1" dirty="0"/>
+                  <a:t>Random-Effects</a:t>
+                </a:r>
+                <a:r>
+                  <a:rPr lang="en-US" sz="2000" dirty="0"/>
+                  <a:t> are the participant-level </a:t>
+                </a:r>
+                <a14:m>
+                  <m:oMath xmlns:m="http://schemas.openxmlformats.org/officeDocument/2006/math">
+                    <m:sSub>
+                      <m:sSubPr>
+                        <m:ctrlPr>
+                          <a:rPr lang="en-US" sz="2000" i="1">
+                            <a:latin typeface="Cambria Math" panose="02040503050406030204" pitchFamily="18" charset="0"/>
+                          </a:rPr>
+                        </m:ctrlPr>
+                      </m:sSubPr>
+                      <m:e>
+                        <m:r>
+                          <a:rPr lang="en-US" sz="2000" i="1">
+                            <a:latin typeface="Cambria Math" panose="02040503050406030204" pitchFamily="18" charset="0"/>
+                          </a:rPr>
+                          <m:t>𝑈</m:t>
+                        </m:r>
+                      </m:e>
+                      <m:sub>
+                        <m:r>
+                          <a:rPr lang="en-US" sz="2000" i="1">
+                            <a:latin typeface="Cambria Math" panose="02040503050406030204" pitchFamily="18" charset="0"/>
+                          </a:rPr>
+                          <m:t>𝑗</m:t>
+                        </m:r>
+                      </m:sub>
+                    </m:sSub>
+                  </m:oMath>
+                </a14:m>
+                <a:r>
+                  <a:rPr lang="en-US" sz="2000" dirty="0"/>
+                  <a:t>'s that remove statistical dependency from our data. (This is bit of a simplification, but you can think of not including the appropriate random-effects like running a between-subjects ANOVA when you should be running a repeated-measures ANOVA.)</a:t>
+                </a:r>
+              </a:p>
+              <a:p>
+                <a:pPr marL="285750" lvl="0" indent="-285750">
+                  <a:buFont typeface="Arial" panose="020B0604020202020204" pitchFamily="34" charset="0"/>
+                  <a:buChar char="•"/>
+                </a:pPr>
+                <a:r>
+                  <a:rPr lang="en-US" sz="2000" dirty="0"/>
+                  <a:t>The </a:t>
+                </a:r>
+                <a:r>
+                  <a:rPr lang="en-US" sz="2000" i="1" dirty="0"/>
+                  <a:t>ERRORS</a:t>
+                </a:r>
+                <a:r>
+                  <a:rPr lang="en-US" sz="2000" dirty="0"/>
+                  <a:t>, or more specifically </a:t>
+                </a:r>
+                <a:r>
+                  <a:rPr lang="en-US" sz="2000" i="1" dirty="0"/>
+                  <a:t>Random </a:t>
+                </a:r>
+                <a:r>
+                  <a:rPr lang="en-US" sz="2000" i="1" dirty="0" smtClean="0"/>
+                  <a:t>Errors (</a:t>
+                </a:r>
+                <a:r>
+                  <a:rPr lang="el-GR" sz="2000" i="1" dirty="0" smtClean="0"/>
+                  <a:t>ϵ</a:t>
+                </a:r>
+                <a:r>
+                  <a:rPr lang="en-US" sz="2000" i="1" baseline="-25000" dirty="0" err="1" smtClean="0"/>
+                  <a:t>ij</a:t>
+                </a:r>
+                <a:r>
+                  <a:rPr lang="en-US" sz="2000" i="1" dirty="0" err="1" smtClean="0"/>
+                  <a:t>’s</a:t>
+                </a:r>
+                <a:r>
+                  <a:rPr lang="en-US" sz="2000" i="1" dirty="0" smtClean="0"/>
+                  <a:t>)</a:t>
+                </a:r>
+                <a:r>
+                  <a:rPr lang="en-US" sz="2000" dirty="0" smtClean="0"/>
+                  <a:t>, </a:t>
+                </a:r>
+                <a:r>
+                  <a:rPr lang="en-US" sz="2000" dirty="0"/>
+                  <a:t>are the difference between our </a:t>
+                </a:r>
+                <a:r>
+                  <a:rPr lang="en-US" sz="2000" i="1" dirty="0"/>
+                  <a:t>MODEL</a:t>
+                </a:r>
+                <a:r>
+                  <a:rPr lang="en-US" sz="2000" dirty="0"/>
+                  <a:t>'s predictions and the actual </a:t>
+                </a:r>
+                <a:r>
+                  <a:rPr lang="en-US" sz="2000" i="1" dirty="0"/>
+                  <a:t>DATA</a:t>
+                </a:r>
+                <a:r>
+                  <a:rPr lang="en-US" sz="2000" dirty="0"/>
+                  <a:t>.</a:t>
+                </a:r>
+              </a:p>
+              <a:p>
+                <a:endParaRPr lang="en-US" sz="2000" dirty="0"/>
+              </a:p>
+            </p:txBody>
+          </p:sp>
+        </mc:Choice>
+        <mc:Fallback xmlns="">
+          <p:sp>
+            <p:nvSpPr>
+              <p:cNvPr id="7" name="TextBox 6"/>
+              <p:cNvSpPr txBox="1">
+                <a:spLocks noRot="1" noChangeAspect="1" noMove="1" noResize="1" noEditPoints="1" noAdjustHandles="1" noChangeArrowheads="1" noChangeShapeType="1" noTextEdit="1"/>
+              </p:cNvSpPr>
+              <p:nvPr/>
+            </p:nvSpPr>
+            <p:spPr>
+              <a:xfrm>
+                <a:off x="838200" y="3077738"/>
+                <a:ext cx="10515599" cy="3568477"/>
+              </a:xfrm>
+              <a:prstGeom prst="rect">
+                <a:avLst/>
+              </a:prstGeom>
+              <a:blipFill>
+                <a:blip r:embed="rId3"/>
+                <a:stretch>
+                  <a:fillRect l="-928" t="-1368"/>
+                </a:stretch>
+              </a:blipFill>
+            </p:spPr>
+            <p:txBody>
+              <a:bodyPr/>
+              <a:lstStyle/>
+              <a:p>
+                <a:r>
+                  <a:rPr lang="en-US">
+                    <a:noFill/>
+                  </a:rPr>
+                  <a:t> </a:t>
+                </a:r>
+              </a:p>
+            </p:txBody>
+          </p:sp>
+        </mc:Fallback>
+      </mc:AlternateContent>
+      <p:sp>
+        <p:nvSpPr>
+          <p:cNvPr id="8" name="TextBox 7"/>
+          <p:cNvSpPr txBox="1"/>
+          <p:nvPr/>
+        </p:nvSpPr>
+        <p:spPr>
+          <a:xfrm>
+            <a:off x="838200" y="1538411"/>
+            <a:ext cx="7809405" cy="830997"/>
+          </a:xfrm>
+          <a:prstGeom prst="rect">
+            <a:avLst/>
+          </a:prstGeom>
+          <a:noFill/>
+        </p:spPr>
+        <p:txBody>
+          <a:bodyPr wrap="square" rtlCol="0">
+            <a:spAutoFit/>
+          </a:bodyPr>
+          <a:lstStyle/>
+          <a:p>
+            <a:r>
+              <a:rPr lang="en-US" sz="2400" dirty="0" smtClean="0"/>
+              <a:t>Remember the general concept of DATA = MODEL + Error.</a:t>
+            </a:r>
+          </a:p>
+          <a:p>
+            <a:r>
+              <a:rPr lang="en-US" sz="2400" dirty="0" smtClean="0"/>
+              <a:t>This can be more elaborately written as:</a:t>
+            </a:r>
+            <a:endParaRPr lang="en-US" sz="2400" dirty="0"/>
+          </a:p>
+        </p:txBody>
+      </p:sp>
+    </p:spTree>
+    <p:extLst>
+      <p:ext uri="{BB962C8B-B14F-4D97-AF65-F5344CB8AC3E}">
+        <p14:creationId xmlns:p14="http://schemas.microsoft.com/office/powerpoint/2010/main" val="1047496979"/>
+      </p:ext>
+    </p:extLst>
+  </p:cSld>
+  <p:clrMapOvr>
+    <a:masterClrMapping/>
+  </p:clrMapOvr>
+</p:sld>
+</file>
+
+<file path=ppt/slides/slide11.xml><?xml version="1.0" encoding="utf-8"?>
+<p:sld xmlns:a="http://schemas.openxmlformats.org/drawingml/2006/main" xmlns:r="http://schemas.openxmlformats.org/officeDocument/2006/relationships" xmlns:p="http://schemas.openxmlformats.org/presentationml/2006/main">
+  <p:cSld>
+    <p:spTree>
+      <p:nvGrpSpPr>
+        <p:cNvPr id="1" name=""/>
+        <p:cNvGrpSpPr/>
+        <p:nvPr/>
+      </p:nvGrpSpPr>
+      <p:grpSpPr>
+        <a:xfrm>
+          <a:off x="0" y="0"/>
+          <a:ext cx="0" cy="0"/>
+          <a:chOff x="0" y="0"/>
+          <a:chExt cx="0" cy="0"/>
+        </a:xfrm>
+      </p:grpSpPr>
+      <p:sp>
+        <p:nvSpPr>
+          <p:cNvPr id="2" name="Title 1"/>
+          <p:cNvSpPr>
+            <a:spLocks noGrp="1"/>
+          </p:cNvSpPr>
+          <p:nvPr>
+            <p:ph type="title"/>
+          </p:nvPr>
+        </p:nvSpPr>
+        <p:spPr/>
+        <p:txBody>
+          <a:bodyPr/>
+          <a:lstStyle/>
+          <a:p>
+            <a:r>
+              <a:rPr lang="en-US" dirty="0" smtClean="0"/>
+              <a:t>10. Assumptions</a:t>
+            </a:r>
+            <a:endParaRPr lang="en-US" dirty="0"/>
+          </a:p>
+        </p:txBody>
+      </p:sp>
+      <p:sp>
+        <p:nvSpPr>
+          <p:cNvPr id="3" name="Content Placeholder 2"/>
+          <p:cNvSpPr>
+            <a:spLocks noGrp="1"/>
+          </p:cNvSpPr>
+          <p:nvPr>
+            <p:ph idx="1"/>
+          </p:nvPr>
+        </p:nvSpPr>
+        <p:spPr/>
+        <p:txBody>
+          <a:bodyPr>
+            <a:normAutofit fontScale="92500" lnSpcReduction="20000"/>
+          </a:bodyPr>
+          <a:lstStyle/>
+          <a:p>
+            <a:r>
+              <a:rPr lang="en-US" dirty="0" smtClean="0"/>
+              <a:t>Normality</a:t>
+            </a:r>
+          </a:p>
+          <a:p>
+            <a:pPr lvl="1"/>
+            <a:r>
+              <a:rPr lang="en-US" dirty="0" smtClean="0"/>
+              <a:t>Does transforming the DV change the model?</a:t>
+            </a:r>
+          </a:p>
+          <a:p>
+            <a:pPr lvl="1"/>
+            <a:r>
+              <a:rPr lang="en-US" dirty="0" smtClean="0"/>
+              <a:t>Make it clear to readers that you tested transformed and raw DVs.</a:t>
+            </a:r>
+          </a:p>
+          <a:p>
+            <a:r>
+              <a:rPr lang="en-US" dirty="0" smtClean="0"/>
+              <a:t>Homoscedasticity</a:t>
+            </a:r>
+          </a:p>
+          <a:p>
+            <a:r>
+              <a:rPr lang="en-US" dirty="0" smtClean="0"/>
+              <a:t>Scale Invariance</a:t>
+            </a:r>
+          </a:p>
+          <a:p>
+            <a:pPr lvl="1"/>
+            <a:r>
+              <a:rPr lang="en-US" dirty="0" smtClean="0"/>
+              <a:t>Is there bias in the models predictions?</a:t>
+            </a:r>
+          </a:p>
+          <a:p>
+            <a:pPr lvl="1"/>
+            <a:r>
+              <a:rPr lang="en-US" dirty="0" smtClean="0"/>
+              <a:t>Explore methods for looking at measurement variance over time.</a:t>
+            </a:r>
+          </a:p>
+          <a:p>
+            <a:r>
+              <a:rPr lang="en-US" dirty="0" smtClean="0"/>
+              <a:t>Influential data points/sources</a:t>
+            </a:r>
+          </a:p>
+          <a:p>
+            <a:pPr lvl="1"/>
+            <a:r>
+              <a:rPr lang="en-US" dirty="0" smtClean="0"/>
+              <a:t>There are tools for checking Cook’s Distances and VIFs in MLMs.</a:t>
+            </a:r>
+          </a:p>
+          <a:p>
+            <a:pPr lvl="1"/>
+            <a:r>
+              <a:rPr lang="en-US" dirty="0" smtClean="0"/>
+              <a:t>Influential data don’t always show up in univariate plots/analyses.</a:t>
+            </a:r>
+          </a:p>
+          <a:p>
+            <a:pPr lvl="2"/>
+            <a:r>
+              <a:rPr lang="en-US" dirty="0" smtClean="0"/>
+              <a:t>See philosophical discussions about outliers and removing influential data points. </a:t>
+            </a:r>
+          </a:p>
+          <a:p>
+            <a:pPr lvl="2"/>
+            <a:r>
+              <a:rPr lang="en-US" dirty="0" smtClean="0"/>
+              <a:t>Run the model both ways and be transparent about what you did in your write-up.</a:t>
+            </a:r>
+          </a:p>
+          <a:p>
+            <a:r>
+              <a:rPr lang="en-US" dirty="0" smtClean="0"/>
+              <a:t>Floor/Ceiling Effects</a:t>
+            </a:r>
+            <a:endParaRPr lang="en-US" dirty="0"/>
+          </a:p>
+        </p:txBody>
+      </p:sp>
+      <p:sp>
+        <p:nvSpPr>
+          <p:cNvPr id="4" name="Slide Number Placeholder 3"/>
+          <p:cNvSpPr>
+            <a:spLocks noGrp="1"/>
+          </p:cNvSpPr>
+          <p:nvPr>
+            <p:ph type="sldNum" sz="quarter" idx="12"/>
+          </p:nvPr>
+        </p:nvSpPr>
+        <p:spPr/>
+        <p:txBody>
+          <a:bodyPr/>
+          <a:lstStyle/>
+          <a:p>
+            <a:fld id="{62D33721-DFD7-43E1-85F9-9FD0AD2C3B28}" type="slidenum">
+              <a:rPr lang="en-US" smtClean="0"/>
+              <a:t>11</a:t>
+            </a:fld>
+            <a:endParaRPr lang="en-US"/>
+          </a:p>
+        </p:txBody>
+      </p:sp>
+    </p:spTree>
+    <p:extLst>
+      <p:ext uri="{BB962C8B-B14F-4D97-AF65-F5344CB8AC3E}">
+        <p14:creationId xmlns:p14="http://schemas.microsoft.com/office/powerpoint/2010/main" val="2470342875"/>
+      </p:ext>
+    </p:extLst>
+  </p:cSld>
+  <p:clrMapOvr>
+    <a:masterClrMapping/>
+  </p:clrMapOvr>
+</p:sld>
+</file>
+
+<file path=ppt/slides/slide12.xml><?xml version="1.0" encoding="utf-8"?>
+<p:sld xmlns:a="http://schemas.openxmlformats.org/drawingml/2006/main" xmlns:r="http://schemas.openxmlformats.org/officeDocument/2006/relationships" xmlns:p="http://schemas.openxmlformats.org/presentationml/2006/main">
+  <p:cSld>
+    <p:spTree>
+      <p:nvGrpSpPr>
+        <p:cNvPr id="1" name=""/>
+        <p:cNvGrpSpPr/>
+        <p:nvPr/>
+      </p:nvGrpSpPr>
+      <p:grpSpPr>
+        <a:xfrm>
+          <a:off x="0" y="0"/>
+          <a:ext cx="0" cy="0"/>
+          <a:chOff x="0" y="0"/>
+          <a:chExt cx="0" cy="0"/>
+        </a:xfrm>
+      </p:grpSpPr>
+      <p:sp>
+        <p:nvSpPr>
+          <p:cNvPr id="2" name="Title 1"/>
+          <p:cNvSpPr>
+            <a:spLocks noGrp="1"/>
+          </p:cNvSpPr>
+          <p:nvPr>
+            <p:ph type="title"/>
+          </p:nvPr>
+        </p:nvSpPr>
+        <p:spPr>
+          <a:xfrm>
+            <a:off x="428708" y="365125"/>
+            <a:ext cx="11302377" cy="1325563"/>
+          </a:xfrm>
+        </p:spPr>
+        <p:txBody>
+          <a:bodyPr/>
+          <a:lstStyle/>
+          <a:p>
+            <a:pPr algn="ctr"/>
+            <a:r>
+              <a:rPr lang="en-US" dirty="0" smtClean="0"/>
+              <a:t>11. </a:t>
+            </a:r>
+            <a:r>
+              <a:rPr lang="en-US" dirty="0" smtClean="0"/>
+              <a:t>How can I actually run my multi-level models?</a:t>
+            </a:r>
+            <a:endParaRPr lang="en-US" dirty="0"/>
+          </a:p>
+        </p:txBody>
+      </p:sp>
+      <p:sp>
+        <p:nvSpPr>
+          <p:cNvPr id="3" name="Content Placeholder 2"/>
+          <p:cNvSpPr>
+            <a:spLocks noGrp="1"/>
+          </p:cNvSpPr>
+          <p:nvPr>
+            <p:ph idx="1"/>
+          </p:nvPr>
+        </p:nvSpPr>
+        <p:spPr>
+          <a:xfrm>
+            <a:off x="838200" y="1502245"/>
+            <a:ext cx="10515600" cy="806063"/>
+          </a:xfrm>
+        </p:spPr>
+        <p:txBody>
+          <a:bodyPr>
+            <a:normAutofit fontScale="77500" lnSpcReduction="20000"/>
+          </a:bodyPr>
+          <a:lstStyle/>
+          <a:p>
+            <a:r>
+              <a:rPr lang="en-US" dirty="0" smtClean="0"/>
+              <a:t>There are numerous texts to help and software packages to do it. They are all slightly different, but users need the same basic understanding of fixed-effects and random-effects to make sure models run correctly. </a:t>
+            </a:r>
+            <a:endParaRPr lang="en-US" dirty="0"/>
+          </a:p>
+        </p:txBody>
+      </p:sp>
+      <p:sp>
+        <p:nvSpPr>
+          <p:cNvPr id="4" name="Slide Number Placeholder 3"/>
+          <p:cNvSpPr>
+            <a:spLocks noGrp="1"/>
+          </p:cNvSpPr>
+          <p:nvPr>
+            <p:ph type="sldNum" sz="quarter" idx="12"/>
+          </p:nvPr>
+        </p:nvSpPr>
+        <p:spPr/>
+        <p:txBody>
+          <a:bodyPr/>
+          <a:lstStyle/>
+          <a:p>
+            <a:fld id="{62D33721-DFD7-43E1-85F9-9FD0AD2C3B28}" type="slidenum">
+              <a:rPr lang="en-US" smtClean="0"/>
+              <a:t>12</a:t>
+            </a:fld>
+            <a:endParaRPr lang="en-US"/>
+          </a:p>
+        </p:txBody>
+      </p:sp>
+      <p:pic>
+        <p:nvPicPr>
+          <p:cNvPr id="5" name="Picture 4" descr="http://ecx.images-amazon.com/images/I/51CtQmIeTQL.jpg"/>
+          <p:cNvPicPr>
+            <a:picLocks noChangeAspect="1" noChangeArrowheads="1"/>
+          </p:cNvPicPr>
+          <p:nvPr/>
+        </p:nvPicPr>
+        <p:blipFill>
+          <a:blip r:embed="rId2">
+            <a:extLst>
+              <a:ext uri="{28A0092B-C50C-407E-A947-70E740481C1C}">
+                <a14:useLocalDpi xmlns:a14="http://schemas.microsoft.com/office/drawing/2010/main" val="0"/>
+              </a:ext>
+            </a:extLst>
+          </a:blip>
+          <a:srcRect/>
+          <a:stretch>
+            <a:fillRect/>
+          </a:stretch>
+        </p:blipFill>
+        <p:spPr bwMode="auto">
+          <a:xfrm>
+            <a:off x="428708" y="2519363"/>
+            <a:ext cx="2743200" cy="3657600"/>
+          </a:xfrm>
+          <a:prstGeom prst="rect">
+            <a:avLst/>
+          </a:prstGeom>
+          <a:noFill/>
+          <a:extLst>
+            <a:ext uri="{909E8E84-426E-40DD-AFC4-6F175D3DCCD1}">
+              <a14:hiddenFill xmlns:a14="http://schemas.microsoft.com/office/drawing/2010/main">
+                <a:solidFill>
+                  <a:srgbClr val="FFFFFF"/>
+                </a:solidFill>
+              </a14:hiddenFill>
+            </a:ext>
+          </a:extLst>
+        </p:spPr>
+      </p:pic>
+      <p:pic>
+        <p:nvPicPr>
+          <p:cNvPr id="6" name="Picture 6" descr="http://ecx.images-amazon.com/images/I/814UviSFLYL.jpg"/>
+          <p:cNvPicPr>
+            <a:picLocks noChangeAspect="1" noChangeArrowheads="1"/>
+          </p:cNvPicPr>
+          <p:nvPr/>
+        </p:nvPicPr>
+        <p:blipFill>
+          <a:blip r:embed="rId3" cstate="print">
+            <a:extLst>
+              <a:ext uri="{28A0092B-C50C-407E-A947-70E740481C1C}">
+                <a14:useLocalDpi xmlns:a14="http://schemas.microsoft.com/office/drawing/2010/main" val="0"/>
+              </a:ext>
+            </a:extLst>
+          </a:blip>
+          <a:srcRect/>
+          <a:stretch>
+            <a:fillRect/>
+          </a:stretch>
+        </p:blipFill>
+        <p:spPr bwMode="auto">
+          <a:xfrm>
+            <a:off x="3761277" y="2519363"/>
+            <a:ext cx="2474507" cy="3657600"/>
+          </a:xfrm>
+          <a:prstGeom prst="rect">
+            <a:avLst/>
+          </a:prstGeom>
+          <a:noFill/>
+          <a:extLst>
+            <a:ext uri="{909E8E84-426E-40DD-AFC4-6F175D3DCCD1}">
+              <a14:hiddenFill xmlns:a14="http://schemas.microsoft.com/office/drawing/2010/main">
+                <a:solidFill>
+                  <a:srgbClr val="FFFFFF"/>
+                </a:solidFill>
+              </a14:hiddenFill>
+            </a:ext>
+          </a:extLst>
+        </p:spPr>
+      </p:pic>
+      <p:sp>
+        <p:nvSpPr>
+          <p:cNvPr id="7" name="TextBox 6"/>
+          <p:cNvSpPr txBox="1"/>
+          <p:nvPr/>
+        </p:nvSpPr>
+        <p:spPr>
+          <a:xfrm>
+            <a:off x="428708" y="6176963"/>
+            <a:ext cx="6075766" cy="369332"/>
+          </a:xfrm>
+          <a:prstGeom prst="rect">
+            <a:avLst/>
+          </a:prstGeom>
+          <a:noFill/>
+        </p:spPr>
+        <p:txBody>
+          <a:bodyPr wrap="none" rtlCol="0">
+            <a:spAutoFit/>
+          </a:bodyPr>
+          <a:lstStyle/>
+          <a:p>
+            <a:r>
+              <a:rPr lang="en-US" dirty="0" smtClean="0"/>
+              <a:t>Most of what I will say has been said better in these resources!</a:t>
+            </a:r>
+            <a:endParaRPr lang="en-US" dirty="0"/>
+          </a:p>
+        </p:txBody>
+      </p:sp>
+      <p:grpSp>
+        <p:nvGrpSpPr>
+          <p:cNvPr id="12" name="Group 11"/>
+          <p:cNvGrpSpPr/>
+          <p:nvPr/>
+        </p:nvGrpSpPr>
+        <p:grpSpPr>
+          <a:xfrm>
+            <a:off x="9406592" y="2531329"/>
+            <a:ext cx="2286000" cy="2857043"/>
+            <a:chOff x="8440097" y="3703822"/>
+            <a:chExt cx="2433660" cy="2857043"/>
+          </a:xfrm>
+        </p:grpSpPr>
+        <p:pic>
+          <p:nvPicPr>
+            <p:cNvPr id="13" name="Picture 10" descr="http://www.uni-giessen.de/cms/fbz/svc/hrz/svc/software/lizenzen/spss/SPSS_IBM_logo.png"/>
+            <p:cNvPicPr>
+              <a:picLocks noChangeAspect="1" noChangeArrowheads="1"/>
+            </p:cNvPicPr>
+            <p:nvPr/>
+          </p:nvPicPr>
+          <p:blipFill>
+            <a:blip r:embed="rId4">
+              <a:extLst>
+                <a:ext uri="{28A0092B-C50C-407E-A947-70E740481C1C}">
+                  <a14:useLocalDpi xmlns:a14="http://schemas.microsoft.com/office/drawing/2010/main" val="0"/>
+                </a:ext>
+              </a:extLst>
+            </a:blip>
+            <a:srcRect/>
+            <a:stretch>
+              <a:fillRect/>
+            </a:stretch>
+          </p:blipFill>
+          <p:spPr bwMode="auto">
+            <a:xfrm>
+              <a:off x="8440098" y="4073154"/>
+              <a:ext cx="2433659" cy="1093669"/>
+            </a:xfrm>
+            <a:prstGeom prst="rect">
+              <a:avLst/>
+            </a:prstGeom>
+            <a:noFill/>
+            <a:extLst>
+              <a:ext uri="{909E8E84-426E-40DD-AFC4-6F175D3DCCD1}">
+                <a14:hiddenFill xmlns:a14="http://schemas.microsoft.com/office/drawing/2010/main">
+                  <a:solidFill>
+                    <a:srgbClr val="FFFFFF"/>
+                  </a:solidFill>
+                </a14:hiddenFill>
+              </a:ext>
+            </a:extLst>
+          </p:spPr>
+        </p:pic>
+        <p:pic>
+          <p:nvPicPr>
+            <p:cNvPr id="14" name="Picture 14" descr="http://uwm.edu/software/wp-content/uploads/sites/76/2014/04/sas-logo.jpg"/>
+            <p:cNvPicPr>
+              <a:picLocks noChangeAspect="1" noChangeArrowheads="1"/>
+            </p:cNvPicPr>
+            <p:nvPr/>
+          </p:nvPicPr>
+          <p:blipFill rotWithShape="1">
+            <a:blip r:embed="rId5">
+              <a:extLst>
+                <a:ext uri="{28A0092B-C50C-407E-A947-70E740481C1C}">
+                  <a14:useLocalDpi xmlns:a14="http://schemas.microsoft.com/office/drawing/2010/main" val="0"/>
+                </a:ext>
+              </a:extLst>
+            </a:blip>
+            <a:srcRect l="15810" t="8892" r="16580" b="14163"/>
+            <a:stretch/>
+          </p:blipFill>
+          <p:spPr bwMode="auto">
+            <a:xfrm>
+              <a:off x="8440098" y="5327243"/>
+              <a:ext cx="2157190" cy="1233622"/>
+            </a:xfrm>
+            <a:prstGeom prst="rect">
+              <a:avLst/>
+            </a:prstGeom>
+            <a:noFill/>
+            <a:extLst>
+              <a:ext uri="{909E8E84-426E-40DD-AFC4-6F175D3DCCD1}">
+                <a14:hiddenFill xmlns:a14="http://schemas.microsoft.com/office/drawing/2010/main">
+                  <a:solidFill>
+                    <a:srgbClr val="FFFFFF"/>
+                  </a:solidFill>
+                </a14:hiddenFill>
+              </a:ext>
+            </a:extLst>
+          </p:spPr>
+        </p:pic>
+        <p:sp>
+          <p:nvSpPr>
+            <p:cNvPr id="15" name="TextBox 14"/>
+            <p:cNvSpPr txBox="1"/>
+            <p:nvPr/>
+          </p:nvSpPr>
+          <p:spPr>
+            <a:xfrm>
+              <a:off x="8440097" y="3703822"/>
+              <a:ext cx="2199448" cy="369332"/>
+            </a:xfrm>
+            <a:prstGeom prst="rect">
+              <a:avLst/>
+            </a:prstGeom>
+            <a:noFill/>
+          </p:spPr>
+          <p:txBody>
+            <a:bodyPr wrap="none" rtlCol="0">
+              <a:spAutoFit/>
+            </a:bodyPr>
+            <a:lstStyle/>
+            <a:p>
+              <a:r>
+                <a:rPr lang="en-US" b="1" i="1" u="sng" dirty="0" smtClean="0"/>
+                <a:t>But you can also use:</a:t>
+              </a:r>
+              <a:endParaRPr lang="en-US" b="1" i="1" u="sng" dirty="0"/>
+            </a:p>
+          </p:txBody>
+        </p:sp>
+      </p:grpSp>
+      <p:pic>
+        <p:nvPicPr>
+          <p:cNvPr id="16" name="Picture 15"/>
+          <p:cNvPicPr>
+            <a:picLocks noChangeAspect="1"/>
+          </p:cNvPicPr>
+          <p:nvPr/>
+        </p:nvPicPr>
+        <p:blipFill>
+          <a:blip r:embed="rId6"/>
+          <a:stretch>
+            <a:fillRect/>
+          </a:stretch>
+        </p:blipFill>
+        <p:spPr>
+          <a:xfrm>
+            <a:off x="6437564" y="2525290"/>
+            <a:ext cx="2743200" cy="1910741"/>
+          </a:xfrm>
+          <a:prstGeom prst="rect">
+            <a:avLst/>
+          </a:prstGeom>
+        </p:spPr>
+      </p:pic>
+      <p:pic>
+        <p:nvPicPr>
+          <p:cNvPr id="1026" name="Picture 2" descr="http://www.ssicentral.com/hlm/HLM7CD.jpg"/>
+          <p:cNvPicPr>
+            <a:picLocks noChangeAspect="1" noChangeArrowheads="1"/>
+          </p:cNvPicPr>
+          <p:nvPr/>
+        </p:nvPicPr>
+        <p:blipFill rotWithShape="1">
+          <a:blip r:embed="rId7" cstate="print">
+            <a:extLst>
+              <a:ext uri="{28A0092B-C50C-407E-A947-70E740481C1C}">
+                <a14:useLocalDpi xmlns:a14="http://schemas.microsoft.com/office/drawing/2010/main" val="0"/>
+              </a:ext>
+            </a:extLst>
+          </a:blip>
+          <a:srcRect t="7371" b="35712"/>
+          <a:stretch/>
+        </p:blipFill>
+        <p:spPr bwMode="auto">
+          <a:xfrm>
+            <a:off x="9406592" y="5455991"/>
+            <a:ext cx="2286000" cy="1173563"/>
+          </a:xfrm>
+          <a:prstGeom prst="rect">
+            <a:avLst/>
+          </a:prstGeom>
+          <a:noFill/>
+          <a:extLst>
+            <a:ext uri="{909E8E84-426E-40DD-AFC4-6F175D3DCCD1}">
+              <a14:hiddenFill xmlns:a14="http://schemas.microsoft.com/office/drawing/2010/main">
+                <a:solidFill>
+                  <a:srgbClr val="FFFFFF"/>
+                </a:solidFill>
+              </a14:hiddenFill>
+            </a:ext>
+          </a:extLst>
+        </p:spPr>
+      </p:pic>
+    </p:spTree>
+    <p:extLst>
+      <p:ext uri="{BB962C8B-B14F-4D97-AF65-F5344CB8AC3E}">
+        <p14:creationId xmlns:p14="http://schemas.microsoft.com/office/powerpoint/2010/main" val="1373274935"/>
+      </p:ext>
+    </p:extLst>
+  </p:cSld>
+  <p:clrMapOvr>
+    <a:masterClrMapping/>
+  </p:clrMapOvr>
+</p:sld>
+</file>
+
+<file path=ppt/slides/slide13.xml><?xml version="1.0" encoding="utf-8"?>
+<p:sld xmlns:a="http://schemas.openxmlformats.org/drawingml/2006/main" xmlns:r="http://schemas.openxmlformats.org/officeDocument/2006/relationships" xmlns:p="http://schemas.openxmlformats.org/presentationml/2006/main">
+  <p:cSld>
+    <p:spTree>
+      <p:nvGrpSpPr>
+        <p:cNvPr id="1" name=""/>
+        <p:cNvGrpSpPr/>
+        <p:nvPr/>
+      </p:nvGrpSpPr>
+      <p:grpSpPr>
+        <a:xfrm>
+          <a:off x="0" y="0"/>
+          <a:ext cx="0" cy="0"/>
+          <a:chOff x="0" y="0"/>
+          <a:chExt cx="0" cy="0"/>
+        </a:xfrm>
+      </p:grpSpPr>
+      <p:sp>
+        <p:nvSpPr>
+          <p:cNvPr id="2" name="Title 1"/>
+          <p:cNvSpPr>
+            <a:spLocks noGrp="1"/>
+          </p:cNvSpPr>
+          <p:nvPr>
+            <p:ph type="title"/>
+          </p:nvPr>
+        </p:nvSpPr>
+        <p:spPr/>
+        <p:txBody>
+          <a:bodyPr/>
+          <a:lstStyle/>
+          <a:p>
+            <a:r>
+              <a:rPr lang="en-US" dirty="0" smtClean="0"/>
+              <a:t>12. Be up front about your limitations.</a:t>
+            </a:r>
+            <a:endParaRPr lang="en-US" dirty="0"/>
+          </a:p>
+        </p:txBody>
+      </p:sp>
+      <p:sp>
+        <p:nvSpPr>
+          <p:cNvPr id="3" name="Content Placeholder 2"/>
+          <p:cNvSpPr>
+            <a:spLocks noGrp="1"/>
+          </p:cNvSpPr>
+          <p:nvPr>
+            <p:ph idx="1"/>
+          </p:nvPr>
+        </p:nvSpPr>
+        <p:spPr/>
+        <p:txBody>
+          <a:bodyPr>
+            <a:normAutofit lnSpcReduction="10000"/>
+          </a:bodyPr>
+          <a:lstStyle/>
+          <a:p>
+            <a:r>
+              <a:rPr lang="en-US" dirty="0" smtClean="0"/>
+              <a:t>Exploratory modelling.</a:t>
+            </a:r>
+          </a:p>
+          <a:p>
+            <a:pPr lvl="1"/>
+            <a:r>
+              <a:rPr lang="en-US" dirty="0" smtClean="0"/>
+              <a:t>You will test a lot of things you probably didn’t plan on testing, but be transparent in the reporting of your analyses.</a:t>
+            </a:r>
+          </a:p>
+          <a:p>
+            <a:pPr lvl="1"/>
+            <a:r>
+              <a:rPr lang="en-US" dirty="0" smtClean="0"/>
+              <a:t>The dataset that generates a model/prediction cannot also be used to confirm that model/prediction.</a:t>
+            </a:r>
+          </a:p>
+          <a:p>
+            <a:endParaRPr lang="en-US" dirty="0"/>
+          </a:p>
+          <a:p>
+            <a:r>
+              <a:rPr lang="en-US" dirty="0" smtClean="0"/>
+              <a:t>Are your results “robust” to the method of analysis?</a:t>
+            </a:r>
+          </a:p>
+          <a:p>
+            <a:pPr lvl="1"/>
+            <a:r>
+              <a:rPr lang="en-US" dirty="0" smtClean="0"/>
+              <a:t>A lot of issues about how you are modelling times, do you meet normality, or should exclude an influential data point can be addressed by running the model both ways.</a:t>
+            </a:r>
+          </a:p>
+          <a:p>
+            <a:pPr lvl="1"/>
+            <a:r>
+              <a:rPr lang="en-US" dirty="0" smtClean="0"/>
+              <a:t>Is the answer the same both time? Is a difference in the </a:t>
+            </a:r>
+            <a:r>
+              <a:rPr lang="en-US" smtClean="0"/>
+              <a:t>answer meaningful?</a:t>
+            </a:r>
+            <a:endParaRPr lang="en-US" dirty="0"/>
+          </a:p>
+        </p:txBody>
+      </p:sp>
+      <p:sp>
+        <p:nvSpPr>
+          <p:cNvPr id="4" name="Slide Number Placeholder 3"/>
+          <p:cNvSpPr>
+            <a:spLocks noGrp="1"/>
+          </p:cNvSpPr>
+          <p:nvPr>
+            <p:ph type="sldNum" sz="quarter" idx="12"/>
+          </p:nvPr>
+        </p:nvSpPr>
+        <p:spPr/>
+        <p:txBody>
+          <a:bodyPr/>
+          <a:lstStyle/>
+          <a:p>
+            <a:fld id="{62D33721-DFD7-43E1-85F9-9FD0AD2C3B28}" type="slidenum">
+              <a:rPr lang="en-US" smtClean="0"/>
+              <a:t>13</a:t>
+            </a:fld>
+            <a:endParaRPr lang="en-US"/>
+          </a:p>
+        </p:txBody>
+      </p:sp>
+    </p:spTree>
+    <p:extLst>
+      <p:ext uri="{BB962C8B-B14F-4D97-AF65-F5344CB8AC3E}">
+        <p14:creationId xmlns:p14="http://schemas.microsoft.com/office/powerpoint/2010/main" val="60865784"/>
+      </p:ext>
+    </p:extLst>
+  </p:cSld>
+  <p:clrMapOvr>
+    <a:masterClrMapping/>
+  </p:clrMapOvr>
+</p:sld>
+</file>
+
 <file path=ppt/slides/slide2.xml><?xml version="1.0" encoding="utf-8"?>
 <p:sld xmlns:a="http://schemas.openxmlformats.org/drawingml/2006/main" xmlns:r="http://schemas.openxmlformats.org/officeDocument/2006/relationships" xmlns:p="http://schemas.openxmlformats.org/presentationml/2006/main">
   <p:cSld>
@@ -3670,17 +5102,21 @@
         <p:spPr/>
         <p:txBody>
           <a:bodyPr>
-            <a:normAutofit lnSpcReduction="10000"/>
+            <a:normAutofit fontScale="92500" lnSpcReduction="20000"/>
           </a:bodyPr>
           <a:lstStyle/>
           <a:p>
             <a:r>
               <a:rPr lang="en-US" b="1" i="1" u="sng" dirty="0" smtClean="0"/>
-              <a:t>Static</a:t>
-            </a:r>
-            <a:r>
-              <a:rPr lang="en-US" dirty="0" smtClean="0"/>
-              <a:t> variables are variables that keep the same value over the course of the study.</a:t>
+              <a:t>Static/ “Fixed”</a:t>
+            </a:r>
+            <a:r>
+              <a:rPr lang="en-US" dirty="0" smtClean="0"/>
+              <a:t> </a:t>
+            </a:r>
+            <a:r>
+              <a:rPr lang="en-US" dirty="0" smtClean="0"/>
+              <a:t>variables are variables that keep the same value over the course of the study.</a:t>
             </a:r>
           </a:p>
           <a:p>
@@ -3689,6 +5125,15 @@
               <a:rPr lang="en-US" dirty="0" smtClean="0"/>
               <a:t>For most longitudinal studies, these are variable that vary between people but stay constant within a person (e.g., gender and age at start of study are example static variables). </a:t>
             </a:r>
+            <a:endParaRPr lang="en-US" dirty="0" smtClean="0"/>
+          </a:p>
+          <a:p>
+            <a:pPr lvl="1"/>
+            <a:r>
+              <a:rPr lang="en-US" dirty="0" smtClean="0"/>
+              <a:t>Can be continuous or categorical.</a:t>
+            </a:r>
+            <a:endParaRPr lang="en-US" dirty="0" smtClean="0"/>
           </a:p>
           <a:p>
             <a:pPr lvl="1"/>
@@ -3697,11 +5142,15 @@
           <a:p>
             <a:r>
               <a:rPr lang="en-US" b="1" i="1" u="sng" dirty="0" smtClean="0"/>
-              <a:t>Dynamic</a:t>
-            </a:r>
-            <a:r>
-              <a:rPr lang="en-US" dirty="0" smtClean="0"/>
-              <a:t> variables are variables that change value over the course of the study.</a:t>
+              <a:t>Dynamic/ “Time Varying”</a:t>
+            </a:r>
+            <a:r>
+              <a:rPr lang="en-US" dirty="0" smtClean="0"/>
+              <a:t> </a:t>
+            </a:r>
+            <a:r>
+              <a:rPr lang="en-US" dirty="0" smtClean="0"/>
+              <a:t>variables are variables that change value over the course of the study.</a:t>
             </a:r>
           </a:p>
           <a:p>
@@ -3716,6 +5165,14 @@
             <a:r>
               <a:rPr lang="en-US" dirty="0" smtClean="0"/>
               <a:t>Most of our dependent variables are also dynamic (i.e., we might have BBS, WMFT, or 10m WT scores at each time point). </a:t>
+            </a:r>
+            <a:endParaRPr lang="en-US" dirty="0" smtClean="0"/>
+          </a:p>
+          <a:p>
+            <a:pPr lvl="1"/>
+            <a:r>
+              <a:rPr lang="en-US" dirty="0" smtClean="0"/>
+              <a:t>Can be continuous or categorical.</a:t>
             </a:r>
             <a:endParaRPr lang="en-US" dirty="0"/>
           </a:p>
@@ -4861,7 +6318,7 @@
           <a:p>
             <a:r>
               <a:rPr lang="en-US" dirty="0" smtClean="0"/>
-              <a:t>3. What effects are you interested in?</a:t>
+              <a:t>3. What does zero mean in your model?</a:t>
             </a:r>
             <a:endParaRPr lang="en-US" dirty="0"/>
           </a:p>
@@ -4869,6 +6326,110 @@
       </p:sp>
       <p:sp>
         <p:nvSpPr>
+          <p:cNvPr id="3" name="Content Placeholder 2"/>
+          <p:cNvSpPr>
+            <a:spLocks noGrp="1"/>
+          </p:cNvSpPr>
+          <p:nvPr>
+            <p:ph idx="1"/>
+          </p:nvPr>
+        </p:nvSpPr>
+        <p:spPr/>
+        <p:txBody>
+          <a:bodyPr>
+            <a:normAutofit fontScale="70000" lnSpcReduction="20000"/>
+          </a:bodyPr>
+          <a:lstStyle/>
+          <a:p>
+            <a:pPr marL="0" indent="0">
+              <a:buNone/>
+            </a:pPr>
+            <a:r>
+              <a:rPr lang="en-US" b="1" u="sng" dirty="0" smtClean="0"/>
+              <a:t>Continuous Variables</a:t>
+            </a:r>
+          </a:p>
+          <a:p>
+            <a:r>
+              <a:rPr lang="en-US" dirty="0" smtClean="0"/>
+              <a:t>Do you have an interpretable zero in your independent variables:</a:t>
+            </a:r>
+          </a:p>
+          <a:p>
+            <a:pPr lvl="1"/>
+            <a:r>
+              <a:rPr lang="en-US" dirty="0" smtClean="0"/>
+              <a:t>Age versus Onset days (Age = 0 doesn’t make sense; Onset = 0 might).</a:t>
+            </a:r>
+          </a:p>
+          <a:p>
+            <a:pPr lvl="1"/>
+            <a:endParaRPr lang="en-US" dirty="0"/>
+          </a:p>
+          <a:p>
+            <a:r>
+              <a:rPr lang="en-US" dirty="0" smtClean="0"/>
+              <a:t>Have you mean-centered the variables in your model?</a:t>
+            </a:r>
+          </a:p>
+          <a:p>
+            <a:pPr lvl="1"/>
+            <a:r>
+              <a:rPr lang="en-US" dirty="0" smtClean="0"/>
+              <a:t>If all variables are mean-centered, you can interpret the effects of one variable “on average” across the other variables.</a:t>
+            </a:r>
+          </a:p>
+          <a:p>
+            <a:pPr lvl="1"/>
+            <a:endParaRPr lang="en-US" dirty="0"/>
+          </a:p>
+          <a:p>
+            <a:r>
+              <a:rPr lang="en-US" dirty="0" smtClean="0"/>
+              <a:t>Is there a separate value you want to center your variables on?</a:t>
+            </a:r>
+          </a:p>
+          <a:p>
+            <a:pPr lvl="1"/>
+            <a:r>
+              <a:rPr lang="en-US" dirty="0" smtClean="0"/>
+              <a:t>I.e., look at group differences at the end rather than beginning by making the terminal point the intercept.</a:t>
+            </a:r>
+          </a:p>
+          <a:p>
+            <a:endParaRPr lang="en-US" dirty="0"/>
+          </a:p>
+          <a:p>
+            <a:pPr marL="0" indent="0">
+              <a:buNone/>
+            </a:pPr>
+            <a:r>
+              <a:rPr lang="en-US" b="1" u="sng" dirty="0" smtClean="0"/>
+              <a:t>Categorical variables</a:t>
+            </a:r>
+            <a:r>
+              <a:rPr lang="en-US" dirty="0" smtClean="0"/>
+              <a:t>: </a:t>
+            </a:r>
+          </a:p>
+          <a:p>
+            <a:r>
+              <a:rPr lang="en-US" dirty="0" smtClean="0"/>
+              <a:t>Contrast coded versus dummy coded variables.</a:t>
+            </a:r>
+          </a:p>
+          <a:p>
+            <a:pPr lvl="1"/>
+            <a:r>
+              <a:rPr lang="en-US" dirty="0" smtClean="0"/>
+              <a:t>Contrast codes make zero the average, dummy codes make the reference group zero. </a:t>
+            </a:r>
+            <a:endParaRPr lang="en-US" dirty="0"/>
+          </a:p>
+        </p:txBody>
+      </p:sp>
+      <p:sp>
+        <p:nvSpPr>
           <p:cNvPr id="4" name="Slide Number Placeholder 3"/>
           <p:cNvSpPr>
             <a:spLocks noGrp="1"/>
@@ -4885,6 +6446,251 @@
             <a:fld id="{62D33721-DFD7-43E1-85F9-9FD0AD2C3B28}" type="slidenum">
               <a:rPr lang="en-US" smtClean="0"/>
               <a:t>4</a:t>
+            </a:fld>
+            <a:endParaRPr lang="en-US"/>
+          </a:p>
+        </p:txBody>
+      </p:sp>
+    </p:spTree>
+    <p:extLst>
+      <p:ext uri="{BB962C8B-B14F-4D97-AF65-F5344CB8AC3E}">
+        <p14:creationId xmlns:p14="http://schemas.microsoft.com/office/powerpoint/2010/main" val="1298301838"/>
+      </p:ext>
+    </p:extLst>
+  </p:cSld>
+  <p:clrMapOvr>
+    <a:masterClrMapping/>
+  </p:clrMapOvr>
+</p:sld>
+</file>
+
+<file path=ppt/slides/slide5.xml><?xml version="1.0" encoding="utf-8"?>
+<p:sld xmlns:a="http://schemas.openxmlformats.org/drawingml/2006/main" xmlns:r="http://schemas.openxmlformats.org/officeDocument/2006/relationships" xmlns:p="http://schemas.openxmlformats.org/presentationml/2006/main">
+  <p:cSld>
+    <p:spTree>
+      <p:nvGrpSpPr>
+        <p:cNvPr id="1" name=""/>
+        <p:cNvGrpSpPr/>
+        <p:nvPr/>
+      </p:nvGrpSpPr>
+      <p:grpSpPr>
+        <a:xfrm>
+          <a:off x="0" y="0"/>
+          <a:ext cx="0" cy="0"/>
+          <a:chOff x="0" y="0"/>
+          <a:chExt cx="0" cy="0"/>
+        </a:xfrm>
+      </p:grpSpPr>
+      <p:sp>
+        <p:nvSpPr>
+          <p:cNvPr id="2" name="Title 1"/>
+          <p:cNvSpPr>
+            <a:spLocks noGrp="1"/>
+          </p:cNvSpPr>
+          <p:nvPr>
+            <p:ph type="title"/>
+          </p:nvPr>
+        </p:nvSpPr>
+        <p:spPr/>
+        <p:txBody>
+          <a:bodyPr/>
+          <a:lstStyle/>
+          <a:p>
+            <a:r>
+              <a:rPr lang="en-US" dirty="0" smtClean="0"/>
+              <a:t>4. Levels of measurement</a:t>
+            </a:r>
+            <a:endParaRPr lang="en-US" dirty="0"/>
+          </a:p>
+        </p:txBody>
+      </p:sp>
+      <p:sp>
+        <p:nvSpPr>
+          <p:cNvPr id="3" name="Content Placeholder 2"/>
+          <p:cNvSpPr>
+            <a:spLocks noGrp="1"/>
+          </p:cNvSpPr>
+          <p:nvPr>
+            <p:ph idx="1"/>
+          </p:nvPr>
+        </p:nvSpPr>
+        <p:spPr/>
+        <p:txBody>
+          <a:bodyPr/>
+          <a:lstStyle/>
+          <a:p>
+            <a:r>
+              <a:rPr lang="en-US" dirty="0" smtClean="0"/>
+              <a:t>Do you really have an interval level variable?</a:t>
+            </a:r>
+          </a:p>
+          <a:p>
+            <a:pPr lvl="1"/>
+            <a:r>
+              <a:rPr lang="en-US" dirty="0" smtClean="0"/>
+              <a:t>The errors that result from treating non-interval data as interval data actually get worse across time (e.g. FIM scores).</a:t>
+            </a:r>
+          </a:p>
+          <a:p>
+            <a:pPr lvl="2"/>
+            <a:r>
+              <a:rPr lang="en-US" dirty="0" smtClean="0"/>
+              <a:t>Especially anytime you break a scale into subscales! </a:t>
+            </a:r>
+          </a:p>
+          <a:p>
+            <a:pPr lvl="1"/>
+            <a:r>
+              <a:rPr lang="en-US" dirty="0" smtClean="0"/>
+              <a:t>Unequal differences in scale warp the shape of the time function.</a:t>
+            </a:r>
+          </a:p>
+          <a:p>
+            <a:pPr lvl="1"/>
+            <a:endParaRPr lang="en-US" dirty="0"/>
+          </a:p>
+          <a:p>
+            <a:r>
+              <a:rPr lang="en-US" dirty="0" smtClean="0"/>
+              <a:t>Look into </a:t>
+            </a:r>
+            <a:r>
+              <a:rPr lang="en-US" dirty="0" err="1" smtClean="0"/>
+              <a:t>Rasch</a:t>
+            </a:r>
+            <a:r>
+              <a:rPr lang="en-US" dirty="0" smtClean="0"/>
+              <a:t> Scaling as an approach to “</a:t>
+            </a:r>
+            <a:r>
+              <a:rPr lang="en-US" dirty="0" err="1" smtClean="0"/>
+              <a:t>intervalizing</a:t>
+            </a:r>
+            <a:r>
+              <a:rPr lang="en-US" dirty="0" smtClean="0"/>
+              <a:t>” ordinal data. </a:t>
+            </a:r>
+          </a:p>
+          <a:p>
+            <a:pPr lvl="1"/>
+            <a:r>
+              <a:rPr lang="en-US" dirty="0" smtClean="0"/>
+              <a:t>Pragmatically, check your residuals and the assumptions of the MLM. </a:t>
+            </a:r>
+          </a:p>
+          <a:p>
+            <a:endParaRPr lang="en-US" dirty="0" smtClean="0"/>
+          </a:p>
+          <a:p>
+            <a:endParaRPr lang="en-US" dirty="0"/>
+          </a:p>
+          <a:p>
+            <a:endParaRPr lang="en-US" dirty="0"/>
+          </a:p>
+        </p:txBody>
+      </p:sp>
+      <p:sp>
+        <p:nvSpPr>
+          <p:cNvPr id="4" name="Slide Number Placeholder 3"/>
+          <p:cNvSpPr>
+            <a:spLocks noGrp="1"/>
+          </p:cNvSpPr>
+          <p:nvPr>
+            <p:ph type="sldNum" sz="quarter" idx="12"/>
+          </p:nvPr>
+        </p:nvSpPr>
+        <p:spPr/>
+        <p:txBody>
+          <a:bodyPr/>
+          <a:lstStyle/>
+          <a:p>
+            <a:fld id="{62D33721-DFD7-43E1-85F9-9FD0AD2C3B28}" type="slidenum">
+              <a:rPr lang="en-US" smtClean="0"/>
+              <a:t>5</a:t>
+            </a:fld>
+            <a:endParaRPr lang="en-US"/>
+          </a:p>
+        </p:txBody>
+      </p:sp>
+    </p:spTree>
+    <p:extLst>
+      <p:ext uri="{BB962C8B-B14F-4D97-AF65-F5344CB8AC3E}">
+        <p14:creationId xmlns:p14="http://schemas.microsoft.com/office/powerpoint/2010/main" val="835756205"/>
+      </p:ext>
+    </p:extLst>
+  </p:cSld>
+  <p:clrMapOvr>
+    <a:masterClrMapping/>
+  </p:clrMapOvr>
+</p:sld>
+</file>
+
+<file path=ppt/slides/slide6.xml><?xml version="1.0" encoding="utf-8"?>
+<p:sld xmlns:a="http://schemas.openxmlformats.org/drawingml/2006/main" xmlns:r="http://schemas.openxmlformats.org/officeDocument/2006/relationships" xmlns:p="http://schemas.openxmlformats.org/presentationml/2006/main">
+  <p:cSld>
+    <p:spTree>
+      <p:nvGrpSpPr>
+        <p:cNvPr id="1" name=""/>
+        <p:cNvGrpSpPr/>
+        <p:nvPr/>
+      </p:nvGrpSpPr>
+      <p:grpSpPr>
+        <a:xfrm>
+          <a:off x="0" y="0"/>
+          <a:ext cx="0" cy="0"/>
+          <a:chOff x="0" y="0"/>
+          <a:chExt cx="0" cy="0"/>
+        </a:xfrm>
+      </p:grpSpPr>
+      <p:sp>
+        <p:nvSpPr>
+          <p:cNvPr id="2" name="Title 1"/>
+          <p:cNvSpPr>
+            <a:spLocks noGrp="1"/>
+          </p:cNvSpPr>
+          <p:nvPr>
+            <p:ph type="title"/>
+          </p:nvPr>
+        </p:nvSpPr>
+        <p:spPr/>
+        <p:txBody>
+          <a:bodyPr/>
+          <a:lstStyle/>
+          <a:p>
+            <a:r>
+              <a:rPr lang="en-US" dirty="0" smtClean="0"/>
+              <a:t>5.</a:t>
+            </a:r>
+            <a:r>
+              <a:rPr lang="en-US" dirty="0" smtClean="0"/>
+              <a:t> </a:t>
+            </a:r>
+            <a:r>
+              <a:rPr lang="en-US" dirty="0" smtClean="0"/>
+              <a:t>What effects are you interested in?</a:t>
+            </a:r>
+            <a:endParaRPr lang="en-US" dirty="0"/>
+          </a:p>
+        </p:txBody>
+      </p:sp>
+      <p:sp>
+        <p:nvSpPr>
+          <p:cNvPr id="4" name="Slide Number Placeholder 3"/>
+          <p:cNvSpPr>
+            <a:spLocks noGrp="1"/>
+          </p:cNvSpPr>
+          <p:nvPr>
+            <p:ph type="sldNum" sz="quarter" idx="12"/>
+          </p:nvPr>
+        </p:nvSpPr>
+        <p:spPr/>
+        <p:txBody>
+          <a:bodyPr/>
+          <a:lstStyle/>
+          <a:p>
+            <a:fld id="{62D33721-DFD7-43E1-85F9-9FD0AD2C3B28}" type="slidenum">
+              <a:rPr lang="en-US" smtClean="0"/>
+              <a:t>6</a:t>
             </a:fld>
             <a:endParaRPr lang="en-US"/>
           </a:p>
@@ -5441,347 +7247,6 @@
     <p:extLst>
       <p:ext uri="{BB962C8B-B14F-4D97-AF65-F5344CB8AC3E}">
         <p14:creationId xmlns:p14="http://schemas.microsoft.com/office/powerpoint/2010/main" val="3418966786"/>
-      </p:ext>
-    </p:extLst>
-  </p:cSld>
-  <p:clrMapOvr>
-    <a:masterClrMapping/>
-  </p:clrMapOvr>
-  <p:timing>
-    <p:tnLst>
-      <p:par>
-        <p:cTn id="1" dur="indefinite" restart="never" nodeType="tmRoot"/>
-      </p:par>
-    </p:tnLst>
-  </p:timing>
-</p:sld>
-</file>
-
-<file path=ppt/slides/slide5.xml><?xml version="1.0" encoding="utf-8"?>
-<p:sld xmlns:a="http://schemas.openxmlformats.org/drawingml/2006/main" xmlns:r="http://schemas.openxmlformats.org/officeDocument/2006/relationships" xmlns:p="http://schemas.openxmlformats.org/presentationml/2006/main">
-  <p:cSld>
-    <p:spTree>
-      <p:nvGrpSpPr>
-        <p:cNvPr id="1" name=""/>
-        <p:cNvGrpSpPr/>
-        <p:nvPr/>
-      </p:nvGrpSpPr>
-      <p:grpSpPr>
-        <a:xfrm>
-          <a:off x="0" y="0"/>
-          <a:ext cx="0" cy="0"/>
-          <a:chOff x="0" y="0"/>
-          <a:chExt cx="0" cy="0"/>
-        </a:xfrm>
-      </p:grpSpPr>
-      <p:sp>
-        <p:nvSpPr>
-          <p:cNvPr id="2" name="Title 1"/>
-          <p:cNvSpPr>
-            <a:spLocks noGrp="1"/>
-          </p:cNvSpPr>
-          <p:nvPr>
-            <p:ph type="title"/>
-          </p:nvPr>
-        </p:nvSpPr>
-        <p:spPr/>
-        <p:txBody>
-          <a:bodyPr/>
-          <a:lstStyle/>
-          <a:p>
-            <a:r>
-              <a:rPr lang="en-US" dirty="0" smtClean="0"/>
-              <a:t>4. How do I compare between models?</a:t>
-            </a:r>
-            <a:endParaRPr lang="en-US" dirty="0"/>
-          </a:p>
-        </p:txBody>
-      </p:sp>
-      <p:sp>
-        <p:nvSpPr>
-          <p:cNvPr id="3" name="Content Placeholder 2"/>
-          <p:cNvSpPr>
-            <a:spLocks noGrp="1"/>
-          </p:cNvSpPr>
-          <p:nvPr>
-            <p:ph idx="1"/>
-          </p:nvPr>
-        </p:nvSpPr>
-        <p:spPr/>
-        <p:txBody>
-          <a:bodyPr>
-            <a:normAutofit fontScale="92500" lnSpcReduction="20000"/>
-          </a:bodyPr>
-          <a:lstStyle/>
-          <a:p>
-            <a:r>
-              <a:rPr lang="en-US" dirty="0" smtClean="0"/>
-              <a:t>Models can have different methods of estimation in order to fit their parameters:</a:t>
-            </a:r>
-          </a:p>
-          <a:p>
-            <a:pPr lvl="1"/>
-            <a:r>
-              <a:rPr lang="en-US" dirty="0" smtClean="0"/>
-              <a:t>ML – maximum likelihood estimation.</a:t>
-            </a:r>
-          </a:p>
-          <a:p>
-            <a:pPr lvl="1"/>
-            <a:r>
-              <a:rPr lang="en-US" dirty="0" smtClean="0"/>
-              <a:t>REML – restricted maximum likelihood estimation.</a:t>
-            </a:r>
-          </a:p>
-          <a:p>
-            <a:endParaRPr lang="en-US" dirty="0"/>
-          </a:p>
-          <a:p>
-            <a:r>
-              <a:rPr lang="en-US" dirty="0" smtClean="0"/>
-              <a:t>Often we prefer ML to REML because it allows us to compare nested models using likelihood based methods like the change in deviance or the </a:t>
-            </a:r>
-            <a:r>
-              <a:rPr lang="en-US" dirty="0" err="1" smtClean="0"/>
-              <a:t>Akaike</a:t>
-            </a:r>
-            <a:r>
-              <a:rPr lang="en-US" dirty="0" smtClean="0"/>
-              <a:t> Information Criterion (AIC). </a:t>
-            </a:r>
-          </a:p>
-          <a:p>
-            <a:pPr lvl="1"/>
-            <a:r>
-              <a:rPr lang="en-US" dirty="0" smtClean="0"/>
-              <a:t>Deviance is a measure of the amount of error in a model, so lower deviance means a better model.</a:t>
-            </a:r>
-          </a:p>
-          <a:p>
-            <a:pPr lvl="2"/>
-            <a:r>
-              <a:rPr lang="en-US" dirty="0" smtClean="0"/>
-              <a:t>This can be tested statistically with the Wald Test of the change in deviance. </a:t>
-            </a:r>
-          </a:p>
-          <a:p>
-            <a:pPr lvl="1"/>
-            <a:r>
-              <a:rPr lang="en-US" dirty="0" smtClean="0"/>
-              <a:t>AIC is also a measure of error in a model, so lower AIC means a better model.</a:t>
-            </a:r>
-          </a:p>
-          <a:p>
-            <a:pPr lvl="2"/>
-            <a:r>
-              <a:rPr lang="en-US" dirty="0" smtClean="0"/>
-              <a:t>However, the AIC also introduces a penalty for the number of parameters in a model. This makes the AIC more conservative and helps prevent “over-fitting” of the model.</a:t>
-            </a:r>
-            <a:endParaRPr lang="en-US" dirty="0"/>
-          </a:p>
-        </p:txBody>
-      </p:sp>
-      <p:sp>
-        <p:nvSpPr>
-          <p:cNvPr id="4" name="Slide Number Placeholder 3"/>
-          <p:cNvSpPr>
-            <a:spLocks noGrp="1"/>
-          </p:cNvSpPr>
-          <p:nvPr>
-            <p:ph type="sldNum" sz="quarter" idx="12"/>
-          </p:nvPr>
-        </p:nvSpPr>
-        <p:spPr/>
-        <p:txBody>
-          <a:bodyPr/>
-          <a:lstStyle/>
-          <a:p>
-            <a:fld id="{62D33721-DFD7-43E1-85F9-9FD0AD2C3B28}" type="slidenum">
-              <a:rPr lang="en-US" smtClean="0"/>
-              <a:t>5</a:t>
-            </a:fld>
-            <a:endParaRPr lang="en-US"/>
-          </a:p>
-        </p:txBody>
-      </p:sp>
-    </p:spTree>
-    <p:extLst>
-      <p:ext uri="{BB962C8B-B14F-4D97-AF65-F5344CB8AC3E}">
-        <p14:creationId xmlns:p14="http://schemas.microsoft.com/office/powerpoint/2010/main" val="3567813855"/>
-      </p:ext>
-    </p:extLst>
-  </p:cSld>
-  <p:clrMapOvr>
-    <a:masterClrMapping/>
-  </p:clrMapOvr>
-  <p:timing>
-    <p:tnLst>
-      <p:par>
-        <p:cTn id="1" dur="indefinite" restart="never" nodeType="tmRoot"/>
-      </p:par>
-    </p:tnLst>
-  </p:timing>
-</p:sld>
-</file>
-
-<file path=ppt/slides/slide6.xml><?xml version="1.0" encoding="utf-8"?>
-<p:sld xmlns:a="http://schemas.openxmlformats.org/drawingml/2006/main" xmlns:r="http://schemas.openxmlformats.org/officeDocument/2006/relationships" xmlns:p="http://schemas.openxmlformats.org/presentationml/2006/main">
-  <p:cSld>
-    <p:spTree>
-      <p:nvGrpSpPr>
-        <p:cNvPr id="1" name=""/>
-        <p:cNvGrpSpPr/>
-        <p:nvPr/>
-      </p:nvGrpSpPr>
-      <p:grpSpPr>
-        <a:xfrm>
-          <a:off x="0" y="0"/>
-          <a:ext cx="0" cy="0"/>
-          <a:chOff x="0" y="0"/>
-          <a:chExt cx="0" cy="0"/>
-        </a:xfrm>
-      </p:grpSpPr>
-      <p:sp>
-        <p:nvSpPr>
-          <p:cNvPr id="2" name="Title 1"/>
-          <p:cNvSpPr>
-            <a:spLocks noGrp="1"/>
-          </p:cNvSpPr>
-          <p:nvPr>
-            <p:ph type="title"/>
-          </p:nvPr>
-        </p:nvSpPr>
-        <p:spPr/>
-        <p:txBody>
-          <a:bodyPr/>
-          <a:lstStyle/>
-          <a:p>
-            <a:r>
-              <a:rPr lang="en-US" dirty="0" smtClean="0"/>
-              <a:t>5. How do I statistically power a longitudinal study?</a:t>
-            </a:r>
-            <a:endParaRPr lang="en-US" dirty="0"/>
-          </a:p>
-        </p:txBody>
-      </p:sp>
-      <p:sp>
-        <p:nvSpPr>
-          <p:cNvPr id="3" name="Content Placeholder 2"/>
-          <p:cNvSpPr>
-            <a:spLocks noGrp="1"/>
-          </p:cNvSpPr>
-          <p:nvPr>
-            <p:ph idx="1"/>
-          </p:nvPr>
-        </p:nvSpPr>
-        <p:spPr>
-          <a:xfrm>
-            <a:off x="838200" y="1859078"/>
-            <a:ext cx="10515600" cy="4351338"/>
-          </a:xfrm>
-        </p:spPr>
-        <p:txBody>
-          <a:bodyPr>
-            <a:normAutofit fontScale="85000" lnSpcReduction="20000"/>
-          </a:bodyPr>
-          <a:lstStyle/>
-          <a:p>
-            <a:r>
-              <a:rPr lang="en-US" dirty="0" smtClean="0"/>
-              <a:t>Statistical power for multi-level models gets pretty complicated, so it is highly recommended that you talk to a statistical consultant. In preparation for that meeting, you’ll want to be able to phrase your main narrative hypothesis as a statistical hypothesis like the following:</a:t>
-            </a:r>
-          </a:p>
-          <a:p>
-            <a:pPr lvl="1"/>
-            <a:r>
-              <a:rPr lang="en-US" dirty="0" smtClean="0"/>
-              <a:t>“I am interested in the main-effect of time.”</a:t>
-            </a:r>
-          </a:p>
-          <a:p>
-            <a:pPr lvl="2"/>
-            <a:r>
-              <a:rPr lang="en-US" dirty="0" smtClean="0"/>
-              <a:t>You will need to estimate how much you expect participants to change over time, estimate the average standard deviation at each time point, and the average correlation between time points.</a:t>
-            </a:r>
-          </a:p>
-          <a:p>
-            <a:pPr lvl="1"/>
-            <a:r>
-              <a:rPr lang="en-US" dirty="0" smtClean="0"/>
-              <a:t>“I am interested in the interaction of time and group.”</a:t>
-            </a:r>
-          </a:p>
-          <a:p>
-            <a:pPr lvl="2"/>
-            <a:r>
-              <a:rPr lang="en-US" dirty="0" smtClean="0"/>
-              <a:t>You will need to estimate all of the same information as above, but you will need to estimate it for each group.</a:t>
-            </a:r>
-          </a:p>
-          <a:p>
-            <a:pPr lvl="2"/>
-            <a:endParaRPr lang="en-US" dirty="0"/>
-          </a:p>
-          <a:p>
-            <a:r>
-              <a:rPr lang="en-US" dirty="0" smtClean="0"/>
-              <a:t>As a rule of thumb, increasing the number of </a:t>
-            </a:r>
-            <a:r>
-              <a:rPr lang="en-US" b="1" i="1" dirty="0" smtClean="0"/>
-              <a:t>time-points</a:t>
-            </a:r>
-            <a:r>
-              <a:rPr lang="en-US" dirty="0" smtClean="0"/>
-              <a:t> will improve power for effects at the time-level and person by time interactions.</a:t>
-            </a:r>
-          </a:p>
-          <a:p>
-            <a:pPr lvl="1"/>
-            <a:r>
-              <a:rPr lang="en-US" dirty="0" smtClean="0"/>
-              <a:t>Increasing the number of </a:t>
-            </a:r>
-            <a:r>
-              <a:rPr lang="en-US" b="1" i="1" dirty="0" smtClean="0"/>
-              <a:t>participants</a:t>
-            </a:r>
-            <a:r>
-              <a:rPr lang="en-US" dirty="0" smtClean="0"/>
-              <a:t> will improve power for effects at the person-level and person by time interactions.</a:t>
-            </a:r>
-            <a:endParaRPr lang="en-US" dirty="0"/>
-          </a:p>
-        </p:txBody>
-      </p:sp>
-      <p:sp>
-        <p:nvSpPr>
-          <p:cNvPr id="4" name="Slide Number Placeholder 3"/>
-          <p:cNvSpPr>
-            <a:spLocks noGrp="1"/>
-          </p:cNvSpPr>
-          <p:nvPr>
-            <p:ph type="sldNum" sz="quarter" idx="12"/>
-          </p:nvPr>
-        </p:nvSpPr>
-        <p:spPr/>
-        <p:txBody>
-          <a:bodyPr/>
-          <a:lstStyle/>
-          <a:p>
-            <a:fld id="{62D33721-DFD7-43E1-85F9-9FD0AD2C3B28}" type="slidenum">
-              <a:rPr lang="en-US" smtClean="0"/>
-              <a:t>6</a:t>
-            </a:fld>
-            <a:endParaRPr lang="en-US"/>
-          </a:p>
-        </p:txBody>
-      </p:sp>
-    </p:spTree>
-    <p:extLst>
-      <p:ext uri="{BB962C8B-B14F-4D97-AF65-F5344CB8AC3E}">
-        <p14:creationId xmlns:p14="http://schemas.microsoft.com/office/powerpoint/2010/main" val="871376158"/>
       </p:ext>
     </p:extLst>
   </p:cSld>
@@ -5831,8 +7296,373 @@
           <a:lstStyle/>
           <a:p>
             <a:r>
-              <a:rPr lang="en-US" dirty="0" smtClean="0"/>
-              <a:t>6. What if I have multiple levels?</a:t>
+              <a:rPr lang="en-US" dirty="0"/>
+              <a:t>6</a:t>
+            </a:r>
+            <a:r>
+              <a:rPr lang="en-US" dirty="0" smtClean="0"/>
+              <a:t>. </a:t>
+            </a:r>
+            <a:r>
+              <a:rPr lang="en-US" dirty="0" smtClean="0"/>
+              <a:t>How do I compare between models?</a:t>
+            </a:r>
+            <a:endParaRPr lang="en-US" dirty="0"/>
+          </a:p>
+        </p:txBody>
+      </p:sp>
+      <p:sp>
+        <p:nvSpPr>
+          <p:cNvPr id="3" name="Content Placeholder 2"/>
+          <p:cNvSpPr>
+            <a:spLocks noGrp="1"/>
+          </p:cNvSpPr>
+          <p:nvPr>
+            <p:ph idx="1"/>
+          </p:nvPr>
+        </p:nvSpPr>
+        <p:spPr/>
+        <p:txBody>
+          <a:bodyPr>
+            <a:normAutofit fontScale="92500" lnSpcReduction="20000"/>
+          </a:bodyPr>
+          <a:lstStyle/>
+          <a:p>
+            <a:r>
+              <a:rPr lang="en-US" dirty="0" smtClean="0"/>
+              <a:t>Models can have different methods of estimation in order to fit their parameters:</a:t>
+            </a:r>
+          </a:p>
+          <a:p>
+            <a:pPr lvl="1"/>
+            <a:r>
+              <a:rPr lang="en-US" dirty="0" smtClean="0"/>
+              <a:t>ML – maximum likelihood estimation.</a:t>
+            </a:r>
+          </a:p>
+          <a:p>
+            <a:pPr lvl="1"/>
+            <a:r>
+              <a:rPr lang="en-US" dirty="0" smtClean="0"/>
+              <a:t>REML – restricted maximum likelihood estimation.</a:t>
+            </a:r>
+          </a:p>
+          <a:p>
+            <a:endParaRPr lang="en-US" dirty="0"/>
+          </a:p>
+          <a:p>
+            <a:r>
+              <a:rPr lang="en-US" dirty="0" smtClean="0"/>
+              <a:t>Often we prefer ML to REML because it allows us to compare nested models using likelihood based methods like the change in deviance or the </a:t>
+            </a:r>
+            <a:r>
+              <a:rPr lang="en-US" dirty="0" err="1" smtClean="0"/>
+              <a:t>Akaike</a:t>
+            </a:r>
+            <a:r>
+              <a:rPr lang="en-US" dirty="0" smtClean="0"/>
+              <a:t> Information Criterion (AIC). </a:t>
+            </a:r>
+          </a:p>
+          <a:p>
+            <a:pPr lvl="1"/>
+            <a:r>
+              <a:rPr lang="en-US" dirty="0" smtClean="0"/>
+              <a:t>Deviance is a measure of the amount of error in a model, so lower deviance means a better model.</a:t>
+            </a:r>
+          </a:p>
+          <a:p>
+            <a:pPr lvl="2"/>
+            <a:r>
+              <a:rPr lang="en-US" dirty="0" smtClean="0"/>
+              <a:t>This can be tested statistically with the Wald Test of the change in deviance. </a:t>
+            </a:r>
+          </a:p>
+          <a:p>
+            <a:pPr lvl="1"/>
+            <a:r>
+              <a:rPr lang="en-US" dirty="0" smtClean="0"/>
+              <a:t>AIC is also a measure of error in a model, so lower AIC means a better model.</a:t>
+            </a:r>
+          </a:p>
+          <a:p>
+            <a:pPr lvl="2"/>
+            <a:r>
+              <a:rPr lang="en-US" dirty="0" smtClean="0"/>
+              <a:t>However, the AIC also introduces a penalty for the number of parameters in a model. This makes the AIC more conservative and helps prevent “over-fitting” of the model.</a:t>
+            </a:r>
+            <a:endParaRPr lang="en-US" dirty="0"/>
+          </a:p>
+        </p:txBody>
+      </p:sp>
+      <p:sp>
+        <p:nvSpPr>
+          <p:cNvPr id="4" name="Slide Number Placeholder 3"/>
+          <p:cNvSpPr>
+            <a:spLocks noGrp="1"/>
+          </p:cNvSpPr>
+          <p:nvPr>
+            <p:ph type="sldNum" sz="quarter" idx="12"/>
+          </p:nvPr>
+        </p:nvSpPr>
+        <p:spPr/>
+        <p:txBody>
+          <a:bodyPr/>
+          <a:lstStyle/>
+          <a:p>
+            <a:fld id="{62D33721-DFD7-43E1-85F9-9FD0AD2C3B28}" type="slidenum">
+              <a:rPr lang="en-US" smtClean="0"/>
+              <a:t>7</a:t>
+            </a:fld>
+            <a:endParaRPr lang="en-US"/>
+          </a:p>
+        </p:txBody>
+      </p:sp>
+    </p:spTree>
+    <p:extLst>
+      <p:ext uri="{BB962C8B-B14F-4D97-AF65-F5344CB8AC3E}">
+        <p14:creationId xmlns:p14="http://schemas.microsoft.com/office/powerpoint/2010/main" val="3567813855"/>
+      </p:ext>
+    </p:extLst>
+  </p:cSld>
+  <p:clrMapOvr>
+    <a:masterClrMapping/>
+  </p:clrMapOvr>
+  <p:timing>
+    <p:tnLst>
+      <p:par>
+        <p:cTn id="1" dur="indefinite" restart="never" nodeType="tmRoot"/>
+      </p:par>
+    </p:tnLst>
+  </p:timing>
+</p:sld>
+</file>
+
+<file path=ppt/slides/slide8.xml><?xml version="1.0" encoding="utf-8"?>
+<p:sld xmlns:a="http://schemas.openxmlformats.org/drawingml/2006/main" xmlns:r="http://schemas.openxmlformats.org/officeDocument/2006/relationships" xmlns:p="http://schemas.openxmlformats.org/presentationml/2006/main">
+  <p:cSld>
+    <p:spTree>
+      <p:nvGrpSpPr>
+        <p:cNvPr id="1" name=""/>
+        <p:cNvGrpSpPr/>
+        <p:nvPr/>
+      </p:nvGrpSpPr>
+      <p:grpSpPr>
+        <a:xfrm>
+          <a:off x="0" y="0"/>
+          <a:ext cx="0" cy="0"/>
+          <a:chOff x="0" y="0"/>
+          <a:chExt cx="0" cy="0"/>
+        </a:xfrm>
+      </p:grpSpPr>
+      <p:sp>
+        <p:nvSpPr>
+          <p:cNvPr id="2" name="Title 1"/>
+          <p:cNvSpPr>
+            <a:spLocks noGrp="1"/>
+          </p:cNvSpPr>
+          <p:nvPr>
+            <p:ph type="title"/>
+          </p:nvPr>
+        </p:nvSpPr>
+        <p:spPr/>
+        <p:txBody>
+          <a:bodyPr/>
+          <a:lstStyle/>
+          <a:p>
+            <a:r>
+              <a:rPr lang="en-US" dirty="0"/>
+              <a:t>7</a:t>
+            </a:r>
+            <a:r>
+              <a:rPr lang="en-US" dirty="0" smtClean="0"/>
+              <a:t>. </a:t>
+            </a:r>
+            <a:r>
+              <a:rPr lang="en-US" dirty="0" smtClean="0"/>
+              <a:t>How do I statistically power a longitudinal study?</a:t>
+            </a:r>
+            <a:endParaRPr lang="en-US" dirty="0"/>
+          </a:p>
+        </p:txBody>
+      </p:sp>
+      <p:sp>
+        <p:nvSpPr>
+          <p:cNvPr id="3" name="Content Placeholder 2"/>
+          <p:cNvSpPr>
+            <a:spLocks noGrp="1"/>
+          </p:cNvSpPr>
+          <p:nvPr>
+            <p:ph idx="1"/>
+          </p:nvPr>
+        </p:nvSpPr>
+        <p:spPr>
+          <a:xfrm>
+            <a:off x="838200" y="1859078"/>
+            <a:ext cx="10515600" cy="4351338"/>
+          </a:xfrm>
+        </p:spPr>
+        <p:txBody>
+          <a:bodyPr>
+            <a:normAutofit fontScale="85000" lnSpcReduction="20000"/>
+          </a:bodyPr>
+          <a:lstStyle/>
+          <a:p>
+            <a:r>
+              <a:rPr lang="en-US" dirty="0" smtClean="0"/>
+              <a:t>Statistical power for multi-level models gets pretty complicated, so it is highly recommended that you talk to a statistical consultant. In preparation for that meeting, you’ll want to be able to phrase your main narrative hypothesis as a statistical hypothesis like the following:</a:t>
+            </a:r>
+          </a:p>
+          <a:p>
+            <a:pPr lvl="1"/>
+            <a:r>
+              <a:rPr lang="en-US" dirty="0" smtClean="0"/>
+              <a:t>“I am interested in the main-effect of time.”</a:t>
+            </a:r>
+          </a:p>
+          <a:p>
+            <a:pPr lvl="2"/>
+            <a:r>
+              <a:rPr lang="en-US" dirty="0" smtClean="0"/>
+              <a:t>You will need to estimate how much you expect participants to change over time, estimate the average standard deviation at each time point, and the average correlation between time points.</a:t>
+            </a:r>
+          </a:p>
+          <a:p>
+            <a:pPr lvl="1"/>
+            <a:r>
+              <a:rPr lang="en-US" dirty="0" smtClean="0"/>
+              <a:t>“I am interested in the interaction of time and group.”</a:t>
+            </a:r>
+          </a:p>
+          <a:p>
+            <a:pPr lvl="2"/>
+            <a:r>
+              <a:rPr lang="en-US" dirty="0" smtClean="0"/>
+              <a:t>You will need to estimate all of the same information as above, but you will need to estimate it for each group.</a:t>
+            </a:r>
+          </a:p>
+          <a:p>
+            <a:pPr lvl="2"/>
+            <a:endParaRPr lang="en-US" dirty="0"/>
+          </a:p>
+          <a:p>
+            <a:r>
+              <a:rPr lang="en-US" dirty="0" smtClean="0"/>
+              <a:t>As a rule of thumb, increasing the number of </a:t>
+            </a:r>
+            <a:r>
+              <a:rPr lang="en-US" b="1" i="1" dirty="0" smtClean="0"/>
+              <a:t>time-points</a:t>
+            </a:r>
+            <a:r>
+              <a:rPr lang="en-US" dirty="0" smtClean="0"/>
+              <a:t> will improve power for effects at the time-level and person by time interactions.</a:t>
+            </a:r>
+          </a:p>
+          <a:p>
+            <a:pPr lvl="1"/>
+            <a:r>
+              <a:rPr lang="en-US" dirty="0" smtClean="0"/>
+              <a:t>Increasing the number of </a:t>
+            </a:r>
+            <a:r>
+              <a:rPr lang="en-US" b="1" i="1" dirty="0" smtClean="0"/>
+              <a:t>participants</a:t>
+            </a:r>
+            <a:r>
+              <a:rPr lang="en-US" dirty="0" smtClean="0"/>
+              <a:t> will improve power for effects at the person-level and person by time interactions.</a:t>
+            </a:r>
+            <a:endParaRPr lang="en-US" dirty="0"/>
+          </a:p>
+        </p:txBody>
+      </p:sp>
+      <p:sp>
+        <p:nvSpPr>
+          <p:cNvPr id="4" name="Slide Number Placeholder 3"/>
+          <p:cNvSpPr>
+            <a:spLocks noGrp="1"/>
+          </p:cNvSpPr>
+          <p:nvPr>
+            <p:ph type="sldNum" sz="quarter" idx="12"/>
+          </p:nvPr>
+        </p:nvSpPr>
+        <p:spPr/>
+        <p:txBody>
+          <a:bodyPr/>
+          <a:lstStyle/>
+          <a:p>
+            <a:fld id="{62D33721-DFD7-43E1-85F9-9FD0AD2C3B28}" type="slidenum">
+              <a:rPr lang="en-US" smtClean="0"/>
+              <a:t>8</a:t>
+            </a:fld>
+            <a:endParaRPr lang="en-US"/>
+          </a:p>
+        </p:txBody>
+      </p:sp>
+    </p:spTree>
+    <p:extLst>
+      <p:ext uri="{BB962C8B-B14F-4D97-AF65-F5344CB8AC3E}">
+        <p14:creationId xmlns:p14="http://schemas.microsoft.com/office/powerpoint/2010/main" val="871376158"/>
+      </p:ext>
+    </p:extLst>
+  </p:cSld>
+  <p:clrMapOvr>
+    <a:masterClrMapping/>
+  </p:clrMapOvr>
+  <p:timing>
+    <p:tnLst>
+      <p:par>
+        <p:cTn id="1" dur="indefinite" restart="never" nodeType="tmRoot"/>
+      </p:par>
+    </p:tnLst>
+  </p:timing>
+</p:sld>
+</file>
+
+<file path=ppt/slides/slide9.xml><?xml version="1.0" encoding="utf-8"?>
+<p:sld xmlns:a="http://schemas.openxmlformats.org/drawingml/2006/main" xmlns:r="http://schemas.openxmlformats.org/officeDocument/2006/relationships" xmlns:p="http://schemas.openxmlformats.org/presentationml/2006/main">
+  <p:cSld>
+    <p:spTree>
+      <p:nvGrpSpPr>
+        <p:cNvPr id="1" name=""/>
+        <p:cNvGrpSpPr/>
+        <p:nvPr/>
+      </p:nvGrpSpPr>
+      <p:grpSpPr>
+        <a:xfrm>
+          <a:off x="0" y="0"/>
+          <a:ext cx="0" cy="0"/>
+          <a:chOff x="0" y="0"/>
+          <a:chExt cx="0" cy="0"/>
+        </a:xfrm>
+      </p:grpSpPr>
+      <p:sp>
+        <p:nvSpPr>
+          <p:cNvPr id="2" name="Title 1"/>
+          <p:cNvSpPr>
+            <a:spLocks noGrp="1"/>
+          </p:cNvSpPr>
+          <p:nvPr>
+            <p:ph type="title"/>
+          </p:nvPr>
+        </p:nvSpPr>
+        <p:spPr/>
+        <p:txBody>
+          <a:bodyPr/>
+          <a:lstStyle/>
+          <a:p>
+            <a:r>
+              <a:rPr lang="en-US" dirty="0"/>
+              <a:t>8</a:t>
+            </a:r>
+            <a:r>
+              <a:rPr lang="en-US" dirty="0" smtClean="0"/>
+              <a:t>. </a:t>
+            </a:r>
+            <a:r>
+              <a:rPr lang="en-US" dirty="0" smtClean="0"/>
+              <a:t>What if I have multiple levels?</a:t>
             </a:r>
             <a:endParaRPr lang="en-US" dirty="0"/>
           </a:p>
@@ -5899,7 +7729,7 @@
           <a:p>
             <a:fld id="{62D33721-DFD7-43E1-85F9-9FD0AD2C3B28}" type="slidenum">
               <a:rPr lang="en-US" smtClean="0"/>
-              <a:t>7</a:t>
+              <a:t>9</a:t>
             </a:fld>
             <a:endParaRPr lang="en-US"/>
           </a:p>
@@ -7352,1093 +9182,6 @@
     <p:extLst>
       <p:ext uri="{BB962C8B-B14F-4D97-AF65-F5344CB8AC3E}">
         <p14:creationId xmlns:p14="http://schemas.microsoft.com/office/powerpoint/2010/main" val="2998782087"/>
-      </p:ext>
-    </p:extLst>
-  </p:cSld>
-  <p:clrMapOvr>
-    <a:masterClrMapping/>
-  </p:clrMapOvr>
-</p:sld>
-</file>
-
-<file path=ppt/slides/slide8.xml><?xml version="1.0" encoding="utf-8"?>
-<p:sld xmlns:a="http://schemas.openxmlformats.org/drawingml/2006/main" xmlns:r="http://schemas.openxmlformats.org/officeDocument/2006/relationships" xmlns:p="http://schemas.openxmlformats.org/presentationml/2006/main">
-  <p:cSld>
-    <p:spTree>
-      <p:nvGrpSpPr>
-        <p:cNvPr id="1" name=""/>
-        <p:cNvGrpSpPr/>
-        <p:nvPr/>
-      </p:nvGrpSpPr>
-      <p:grpSpPr>
-        <a:xfrm>
-          <a:off x="0" y="0"/>
-          <a:ext cx="0" cy="0"/>
-          <a:chOff x="0" y="0"/>
-          <a:chExt cx="0" cy="0"/>
-        </a:xfrm>
-      </p:grpSpPr>
-      <p:sp>
-        <p:nvSpPr>
-          <p:cNvPr id="2" name="Title 1"/>
-          <p:cNvSpPr>
-            <a:spLocks noGrp="1"/>
-          </p:cNvSpPr>
-          <p:nvPr>
-            <p:ph type="title"/>
-          </p:nvPr>
-        </p:nvSpPr>
-        <p:spPr/>
-        <p:txBody>
-          <a:bodyPr/>
-          <a:lstStyle/>
-          <a:p>
-            <a:r>
-              <a:rPr lang="en-US" dirty="0" smtClean="0"/>
-              <a:t>7. What are Fixed-Effects and Random-Effects?</a:t>
-            </a:r>
-            <a:endParaRPr lang="en-US" dirty="0"/>
-          </a:p>
-        </p:txBody>
-      </p:sp>
-      <p:sp>
-        <p:nvSpPr>
-          <p:cNvPr id="4" name="Slide Number Placeholder 3"/>
-          <p:cNvSpPr>
-            <a:spLocks noGrp="1"/>
-          </p:cNvSpPr>
-          <p:nvPr>
-            <p:ph type="sldNum" sz="quarter" idx="12"/>
-          </p:nvPr>
-        </p:nvSpPr>
-        <p:spPr/>
-        <p:txBody>
-          <a:bodyPr/>
-          <a:lstStyle/>
-          <a:p>
-            <a:fld id="{62D33721-DFD7-43E1-85F9-9FD0AD2C3B28}" type="slidenum">
-              <a:rPr lang="en-US" smtClean="0"/>
-              <a:t>8</a:t>
-            </a:fld>
-            <a:endParaRPr lang="en-US"/>
-          </a:p>
-        </p:txBody>
-      </p:sp>
-      <mc:AlternateContent xmlns:mc="http://schemas.openxmlformats.org/markup-compatibility/2006">
-        <mc:Choice xmlns:a14="http://schemas.microsoft.com/office/drawing/2010/main" Requires="a14">
-          <p:sp>
-            <p:nvSpPr>
-              <p:cNvPr id="6" name="Rectangle 5"/>
-              <p:cNvSpPr/>
-              <p:nvPr/>
-            </p:nvSpPr>
-            <p:spPr>
-              <a:xfrm>
-                <a:off x="3333664" y="2369408"/>
-                <a:ext cx="6159378" cy="491417"/>
-              </a:xfrm>
-              <a:prstGeom prst="rect">
-                <a:avLst/>
-              </a:prstGeom>
-            </p:spPr>
-            <p:txBody>
-              <a:bodyPr wrap="none">
-                <a:spAutoFit/>
-              </a:bodyPr>
-              <a:lstStyle/>
-              <a:p>
-                <a14:m>
-                  <m:oMathPara xmlns:m="http://schemas.openxmlformats.org/officeDocument/2006/math">
-                    <m:oMathParaPr>
-                      <m:jc m:val="centerGroup"/>
-                    </m:oMathParaPr>
-                    <m:oMath xmlns:m="http://schemas.openxmlformats.org/officeDocument/2006/math">
-                      <m:sSub>
-                        <m:sSubPr>
-                          <m:ctrlPr>
-                            <a:rPr lang="en-US" sz="2400">
-                              <a:latin typeface="Cambria Math" panose="02040503050406030204" pitchFamily="18" charset="0"/>
-                            </a:rPr>
-                          </m:ctrlPr>
-                        </m:sSubPr>
-                        <m:e>
-                          <m:r>
-                            <a:rPr lang="en-US" sz="2400" i="1">
-                              <a:latin typeface="Cambria Math" panose="02040503050406030204" pitchFamily="18" charset="0"/>
-                            </a:rPr>
-                            <m:t>𝑦</m:t>
-                          </m:r>
-                        </m:e>
-                        <m:sub>
-                          <m:r>
-                            <a:rPr lang="en-US" sz="2400" i="1">
-                              <a:latin typeface="Cambria Math" panose="02040503050406030204" pitchFamily="18" charset="0"/>
-                            </a:rPr>
-                            <m:t>𝑖𝑗</m:t>
-                          </m:r>
-                        </m:sub>
-                      </m:sSub>
-                      <m:r>
-                        <a:rPr lang="en-US" sz="2400" i="0">
-                          <a:latin typeface="Cambria Math" panose="02040503050406030204" pitchFamily="18" charset="0"/>
-                        </a:rPr>
-                        <m:t>=</m:t>
-                      </m:r>
-                      <m:sSub>
-                        <m:sSubPr>
-                          <m:ctrlPr>
-                            <a:rPr lang="en-US" sz="2400" i="1">
-                              <a:latin typeface="Cambria Math" panose="02040503050406030204" pitchFamily="18" charset="0"/>
-                            </a:rPr>
-                          </m:ctrlPr>
-                        </m:sSubPr>
-                        <m:e>
-                          <m:r>
-                            <a:rPr lang="en-US" sz="2400" i="1">
-                              <a:latin typeface="Cambria Math" panose="02040503050406030204" pitchFamily="18" charset="0"/>
-                            </a:rPr>
-                            <m:t>𝐵</m:t>
-                          </m:r>
-                        </m:e>
-                        <m:sub>
-                          <m:r>
-                            <a:rPr lang="en-US" sz="2400" i="0">
-                              <a:latin typeface="Cambria Math" panose="02040503050406030204" pitchFamily="18" charset="0"/>
-                            </a:rPr>
-                            <m:t>0</m:t>
-                          </m:r>
-                        </m:sub>
-                      </m:sSub>
-                      <m:r>
-                        <a:rPr lang="en-US" sz="2400" i="0">
-                          <a:latin typeface="Cambria Math" panose="02040503050406030204" pitchFamily="18" charset="0"/>
-                        </a:rPr>
-                        <m:t>+</m:t>
-                      </m:r>
-                      <m:sSub>
-                        <m:sSubPr>
-                          <m:ctrlPr>
-                            <a:rPr lang="en-US" sz="2400" i="1">
-                              <a:latin typeface="Cambria Math" panose="02040503050406030204" pitchFamily="18" charset="0"/>
-                            </a:rPr>
-                          </m:ctrlPr>
-                        </m:sSubPr>
-                        <m:e>
-                          <m:r>
-                            <a:rPr lang="en-US" sz="2400" i="1">
-                              <a:latin typeface="Cambria Math" panose="02040503050406030204" pitchFamily="18" charset="0"/>
-                            </a:rPr>
-                            <m:t>𝑈</m:t>
-                          </m:r>
-                        </m:e>
-                        <m:sub>
-                          <m:r>
-                            <a:rPr lang="en-US" sz="2400" i="0">
-                              <a:latin typeface="Cambria Math" panose="02040503050406030204" pitchFamily="18" charset="0"/>
-                            </a:rPr>
-                            <m:t>0</m:t>
-                          </m:r>
-                          <m:r>
-                            <a:rPr lang="en-US" sz="2400" i="1">
-                              <a:latin typeface="Cambria Math" panose="02040503050406030204" pitchFamily="18" charset="0"/>
-                            </a:rPr>
-                            <m:t>𝑗</m:t>
-                          </m:r>
-                        </m:sub>
-                      </m:sSub>
-                      <m:r>
-                        <a:rPr lang="en-US" sz="2400" i="0">
-                          <a:latin typeface="Cambria Math" panose="02040503050406030204" pitchFamily="18" charset="0"/>
-                        </a:rPr>
-                        <m:t>+(</m:t>
-                      </m:r>
-                      <m:sSub>
-                        <m:sSubPr>
-                          <m:ctrlPr>
-                            <a:rPr lang="en-US" sz="2400" i="1">
-                              <a:latin typeface="Cambria Math" panose="02040503050406030204" pitchFamily="18" charset="0"/>
-                            </a:rPr>
-                          </m:ctrlPr>
-                        </m:sSubPr>
-                        <m:e>
-                          <m:r>
-                            <a:rPr lang="en-US" sz="2400" i="1">
-                              <a:latin typeface="Cambria Math" panose="02040503050406030204" pitchFamily="18" charset="0"/>
-                            </a:rPr>
-                            <m:t>𝐵</m:t>
-                          </m:r>
-                        </m:e>
-                        <m:sub>
-                          <m:r>
-                            <a:rPr lang="en-US" sz="2400" i="0">
-                              <a:latin typeface="Cambria Math" panose="02040503050406030204" pitchFamily="18" charset="0"/>
-                            </a:rPr>
-                            <m:t>1</m:t>
-                          </m:r>
-                        </m:sub>
-                      </m:sSub>
-                      <m:r>
-                        <a:rPr lang="en-US" sz="2400" i="0">
-                          <a:latin typeface="Cambria Math" panose="02040503050406030204" pitchFamily="18" charset="0"/>
-                        </a:rPr>
-                        <m:t>+</m:t>
-                      </m:r>
-                      <m:sSub>
-                        <m:sSubPr>
-                          <m:ctrlPr>
-                            <a:rPr lang="en-US" sz="2400" i="1">
-                              <a:latin typeface="Cambria Math" panose="02040503050406030204" pitchFamily="18" charset="0"/>
-                            </a:rPr>
-                          </m:ctrlPr>
-                        </m:sSubPr>
-                        <m:e>
-                          <m:r>
-                            <a:rPr lang="en-US" sz="2400" i="1">
-                              <a:latin typeface="Cambria Math" panose="02040503050406030204" pitchFamily="18" charset="0"/>
-                            </a:rPr>
-                            <m:t>𝑈</m:t>
-                          </m:r>
-                        </m:e>
-                        <m:sub>
-                          <m:r>
-                            <a:rPr lang="en-US" sz="2400" i="0">
-                              <a:latin typeface="Cambria Math" panose="02040503050406030204" pitchFamily="18" charset="0"/>
-                            </a:rPr>
-                            <m:t>1</m:t>
-                          </m:r>
-                          <m:r>
-                            <a:rPr lang="en-US" sz="2400" i="1">
-                              <a:latin typeface="Cambria Math" panose="02040503050406030204" pitchFamily="18" charset="0"/>
-                            </a:rPr>
-                            <m:t>𝑗</m:t>
-                          </m:r>
-                        </m:sub>
-                      </m:sSub>
-                      <m:r>
-                        <a:rPr lang="en-US" sz="2400" i="0">
-                          <a:latin typeface="Cambria Math" panose="02040503050406030204" pitchFamily="18" charset="0"/>
-                        </a:rPr>
-                        <m:t>)∗(</m:t>
-                      </m:r>
-                      <m:r>
-                        <a:rPr lang="en-US" sz="2400" i="1">
-                          <a:latin typeface="Cambria Math" panose="02040503050406030204" pitchFamily="18" charset="0"/>
-                        </a:rPr>
-                        <m:t>𝑇𝐼𝑀</m:t>
-                      </m:r>
-                      <m:sSub>
-                        <m:sSubPr>
-                          <m:ctrlPr>
-                            <a:rPr lang="en-US" sz="2400" i="1">
-                              <a:latin typeface="Cambria Math" panose="02040503050406030204" pitchFamily="18" charset="0"/>
-                            </a:rPr>
-                          </m:ctrlPr>
-                        </m:sSubPr>
-                        <m:e>
-                          <m:r>
-                            <a:rPr lang="en-US" sz="2400" i="1">
-                              <a:latin typeface="Cambria Math" panose="02040503050406030204" pitchFamily="18" charset="0"/>
-                            </a:rPr>
-                            <m:t>𝐸</m:t>
-                          </m:r>
-                        </m:e>
-                        <m:sub>
-                          <m:r>
-                            <a:rPr lang="en-US" sz="2400" i="1">
-                              <a:latin typeface="Cambria Math" panose="02040503050406030204" pitchFamily="18" charset="0"/>
-                            </a:rPr>
-                            <m:t>𝑖𝑗</m:t>
-                          </m:r>
-                        </m:sub>
-                      </m:sSub>
-                      <m:r>
-                        <a:rPr lang="en-US" sz="2400" i="0">
-                          <a:latin typeface="Cambria Math" panose="02040503050406030204" pitchFamily="18" charset="0"/>
-                        </a:rPr>
-                        <m:t>)+</m:t>
-                      </m:r>
-                      <m:sSub>
-                        <m:sSubPr>
-                          <m:ctrlPr>
-                            <a:rPr lang="en-US" sz="2400" i="1">
-                              <a:latin typeface="Cambria Math" panose="02040503050406030204" pitchFamily="18" charset="0"/>
-                            </a:rPr>
-                          </m:ctrlPr>
-                        </m:sSubPr>
-                        <m:e>
-                          <m:r>
-                            <a:rPr lang="en-US" sz="2400" i="1" smtClean="0">
-                              <a:latin typeface="Cambria Math" panose="02040503050406030204" pitchFamily="18" charset="0"/>
-                              <a:ea typeface="Cambria Math" panose="02040503050406030204" pitchFamily="18" charset="0"/>
-                            </a:rPr>
-                            <m:t>𝜖</m:t>
-                          </m:r>
-                        </m:e>
-                        <m:sub>
-                          <m:r>
-                            <a:rPr lang="en-US" sz="2400" i="1">
-                              <a:latin typeface="Cambria Math" panose="02040503050406030204" pitchFamily="18" charset="0"/>
-                            </a:rPr>
-                            <m:t>𝑖𝑗</m:t>
-                          </m:r>
-                        </m:sub>
-                      </m:sSub>
-                    </m:oMath>
-                  </m:oMathPara>
-                </a14:m>
-                <a:endParaRPr lang="en-US" sz="2400" dirty="0"/>
-              </a:p>
-            </p:txBody>
-          </p:sp>
-        </mc:Choice>
-        <mc:Fallback>
-          <p:sp>
-            <p:nvSpPr>
-              <p:cNvPr id="6" name="Rectangle 5"/>
-              <p:cNvSpPr>
-                <a:spLocks noRot="1" noChangeAspect="1" noMove="1" noResize="1" noEditPoints="1" noAdjustHandles="1" noChangeArrowheads="1" noChangeShapeType="1" noTextEdit="1"/>
-              </p:cNvSpPr>
-              <p:nvPr/>
-            </p:nvSpPr>
-            <p:spPr>
-              <a:xfrm>
-                <a:off x="3333664" y="2369408"/>
-                <a:ext cx="6159378" cy="491417"/>
-              </a:xfrm>
-              <a:prstGeom prst="rect">
-                <a:avLst/>
-              </a:prstGeom>
-              <a:blipFill>
-                <a:blip r:embed="rId2"/>
-                <a:stretch>
-                  <a:fillRect b="-12500"/>
-                </a:stretch>
-              </a:blipFill>
-            </p:spPr>
-            <p:txBody>
-              <a:bodyPr/>
-              <a:lstStyle/>
-              <a:p>
-                <a:r>
-                  <a:rPr lang="en-US">
-                    <a:noFill/>
-                  </a:rPr>
-                  <a:t> </a:t>
-                </a:r>
-              </a:p>
-            </p:txBody>
-          </p:sp>
-        </mc:Fallback>
-      </mc:AlternateContent>
-      <mc:AlternateContent xmlns:mc="http://schemas.openxmlformats.org/markup-compatibility/2006">
-        <mc:Choice xmlns:a14="http://schemas.microsoft.com/office/drawing/2010/main" Requires="a14">
-          <p:sp>
-            <p:nvSpPr>
-              <p:cNvPr id="7" name="TextBox 6"/>
-              <p:cNvSpPr txBox="1"/>
-              <p:nvPr/>
-            </p:nvSpPr>
-            <p:spPr>
-              <a:xfrm>
-                <a:off x="838200" y="3077738"/>
-                <a:ext cx="10515599" cy="3568477"/>
-              </a:xfrm>
-              <a:prstGeom prst="rect">
-                <a:avLst/>
-              </a:prstGeom>
-              <a:noFill/>
-            </p:spPr>
-            <p:txBody>
-              <a:bodyPr wrap="square" rtlCol="0">
-                <a:spAutoFit/>
-              </a:bodyPr>
-              <a:lstStyle/>
-              <a:p>
-                <a:r>
-                  <a:rPr lang="en-US" sz="2400" dirty="0" smtClean="0"/>
-                  <a:t>Thus, we </a:t>
-                </a:r>
-                <a:r>
-                  <a:rPr lang="en-US" sz="2400" dirty="0"/>
-                  <a:t>have the following terms in our </a:t>
-                </a:r>
-                <a:r>
-                  <a:rPr lang="en-US" sz="2400" i="1" dirty="0" smtClean="0"/>
-                  <a:t>DATA</a:t>
-                </a:r>
-                <a:r>
-                  <a:rPr lang="en-US" sz="2400" dirty="0" smtClean="0"/>
-                  <a:t> (</a:t>
-                </a:r>
-                <a:r>
-                  <a:rPr lang="en-US" sz="2400" dirty="0" err="1" smtClean="0"/>
-                  <a:t>y</a:t>
-                </a:r>
-                <a:r>
-                  <a:rPr lang="en-US" sz="2400" baseline="-25000" dirty="0" err="1" smtClean="0"/>
-                  <a:t>ij</a:t>
-                </a:r>
-                <a:r>
-                  <a:rPr lang="en-US" sz="2400" dirty="0" err="1" smtClean="0"/>
-                  <a:t>’s</a:t>
-                </a:r>
-                <a:r>
-                  <a:rPr lang="en-US" sz="2400" dirty="0" smtClean="0"/>
-                  <a:t>):</a:t>
-                </a:r>
-                <a:endParaRPr lang="en-US" sz="2400" dirty="0"/>
-              </a:p>
-              <a:p>
-                <a:pPr marL="285750" lvl="0" indent="-285750">
-                  <a:buFont typeface="Arial" panose="020B0604020202020204" pitchFamily="34" charset="0"/>
-                  <a:buChar char="•"/>
-                </a:pPr>
-                <a:r>
-                  <a:rPr lang="en-US" sz="2000" dirty="0"/>
-                  <a:t>The </a:t>
-                </a:r>
-                <a:r>
-                  <a:rPr lang="en-US" sz="2000" i="1" dirty="0"/>
-                  <a:t>MODEL</a:t>
-                </a:r>
-                <a:r>
-                  <a:rPr lang="en-US" sz="2000" dirty="0"/>
-                  <a:t> includes fixed effects and random effects.</a:t>
-                </a:r>
-              </a:p>
-              <a:p>
-                <a:pPr marL="285750" lvl="0" indent="-285750">
-                  <a:buFont typeface="Arial" panose="020B0604020202020204" pitchFamily="34" charset="0"/>
-                  <a:buChar char="•"/>
-                </a:pPr>
-                <a:r>
-                  <a:rPr lang="en-US" sz="2000" b="1" i="1" dirty="0"/>
-                  <a:t>Fixed-Effects</a:t>
-                </a:r>
-                <a:r>
-                  <a:rPr lang="en-US" sz="2000" dirty="0"/>
-                  <a:t> are the group-level </a:t>
-                </a:r>
-                <a14:m>
-                  <m:oMath xmlns:m="http://schemas.openxmlformats.org/officeDocument/2006/math">
-                    <m:r>
-                      <a:rPr lang="en-US" sz="2000" i="1"/>
-                      <m:t>𝐵</m:t>
-                    </m:r>
-                  </m:oMath>
-                </a14:m>
-                <a:r>
-                  <a:rPr lang="en-US" sz="2000" dirty="0"/>
-                  <a:t>'s, these effects parallel the traditional main-effects and interactions that you have probably encountered in other statistical analyses.</a:t>
-                </a:r>
-              </a:p>
-              <a:p>
-                <a:pPr marL="285750" lvl="0" indent="-285750">
-                  <a:buFont typeface="Arial" panose="020B0604020202020204" pitchFamily="34" charset="0"/>
-                  <a:buChar char="•"/>
-                </a:pPr>
-                <a:r>
-                  <a:rPr lang="en-US" sz="2000" b="1" i="1" dirty="0"/>
-                  <a:t>Random-Effects</a:t>
-                </a:r>
-                <a:r>
-                  <a:rPr lang="en-US" sz="2000" dirty="0"/>
-                  <a:t> are the participant-level </a:t>
-                </a:r>
-                <a14:m>
-                  <m:oMath xmlns:m="http://schemas.openxmlformats.org/officeDocument/2006/math">
-                    <m:sSub>
-                      <m:sSubPr>
-                        <m:ctrlPr>
-                          <a:rPr lang="en-US" sz="2000" i="1"/>
-                        </m:ctrlPr>
-                      </m:sSubPr>
-                      <m:e>
-                        <m:r>
-                          <a:rPr lang="en-US" sz="2000" i="1"/>
-                          <m:t>𝑈</m:t>
-                        </m:r>
-                      </m:e>
-                      <m:sub>
-                        <m:r>
-                          <a:rPr lang="en-US" sz="2000" i="1"/>
-                          <m:t>𝑗</m:t>
-                        </m:r>
-                      </m:sub>
-                    </m:sSub>
-                  </m:oMath>
-                </a14:m>
-                <a:r>
-                  <a:rPr lang="en-US" sz="2000" dirty="0"/>
-                  <a:t>'s that remove statistical dependency from our data. (This is bit of a simplification, but you can think of not including the appropriate random-effects like running a between-subjects ANOVA when you should be running a repeated-measures ANOVA.)</a:t>
-                </a:r>
-              </a:p>
-              <a:p>
-                <a:pPr marL="285750" lvl="0" indent="-285750">
-                  <a:buFont typeface="Arial" panose="020B0604020202020204" pitchFamily="34" charset="0"/>
-                  <a:buChar char="•"/>
-                </a:pPr>
-                <a:r>
-                  <a:rPr lang="en-US" sz="2000" dirty="0"/>
-                  <a:t>The </a:t>
-                </a:r>
-                <a:r>
-                  <a:rPr lang="en-US" sz="2000" i="1" dirty="0"/>
-                  <a:t>ERRORS</a:t>
-                </a:r>
-                <a:r>
-                  <a:rPr lang="en-US" sz="2000" dirty="0"/>
-                  <a:t>, or more specifically </a:t>
-                </a:r>
-                <a:r>
-                  <a:rPr lang="en-US" sz="2000" i="1" dirty="0"/>
-                  <a:t>Random </a:t>
-                </a:r>
-                <a:r>
-                  <a:rPr lang="en-US" sz="2000" i="1" dirty="0" smtClean="0"/>
-                  <a:t>Errors (</a:t>
-                </a:r>
-                <a:r>
-                  <a:rPr lang="el-GR" sz="2000" i="1" dirty="0" smtClean="0"/>
-                  <a:t>ϵ</a:t>
-                </a:r>
-                <a:r>
-                  <a:rPr lang="en-US" sz="2000" i="1" baseline="-25000" dirty="0" err="1" smtClean="0"/>
-                  <a:t>ij</a:t>
-                </a:r>
-                <a:r>
-                  <a:rPr lang="en-US" sz="2000" i="1" dirty="0" err="1" smtClean="0"/>
-                  <a:t>’s</a:t>
-                </a:r>
-                <a:r>
-                  <a:rPr lang="en-US" sz="2000" i="1" dirty="0" smtClean="0"/>
-                  <a:t>)</a:t>
-                </a:r>
-                <a:r>
-                  <a:rPr lang="en-US" sz="2000" dirty="0" smtClean="0"/>
-                  <a:t>, </a:t>
-                </a:r>
-                <a:r>
-                  <a:rPr lang="en-US" sz="2000" dirty="0"/>
-                  <a:t>are the difference between our </a:t>
-                </a:r>
-                <a:r>
-                  <a:rPr lang="en-US" sz="2000" i="1" dirty="0"/>
-                  <a:t>MODEL</a:t>
-                </a:r>
-                <a:r>
-                  <a:rPr lang="en-US" sz="2000" dirty="0"/>
-                  <a:t>'s predictions and the actual </a:t>
-                </a:r>
-                <a:r>
-                  <a:rPr lang="en-US" sz="2000" i="1" dirty="0"/>
-                  <a:t>DATA</a:t>
-                </a:r>
-                <a:r>
-                  <a:rPr lang="en-US" sz="2000" dirty="0"/>
-                  <a:t>.</a:t>
-                </a:r>
-              </a:p>
-              <a:p>
-                <a:endParaRPr lang="en-US" sz="2000" dirty="0"/>
-              </a:p>
-            </p:txBody>
-          </p:sp>
-        </mc:Choice>
-        <mc:Fallback>
-          <p:sp>
-            <p:nvSpPr>
-              <p:cNvPr id="7" name="TextBox 6"/>
-              <p:cNvSpPr txBox="1">
-                <a:spLocks noRot="1" noChangeAspect="1" noMove="1" noResize="1" noEditPoints="1" noAdjustHandles="1" noChangeArrowheads="1" noChangeShapeType="1" noTextEdit="1"/>
-              </p:cNvSpPr>
-              <p:nvPr/>
-            </p:nvSpPr>
-            <p:spPr>
-              <a:xfrm>
-                <a:off x="838200" y="3077738"/>
-                <a:ext cx="10515599" cy="3568477"/>
-              </a:xfrm>
-              <a:prstGeom prst="rect">
-                <a:avLst/>
-              </a:prstGeom>
-              <a:blipFill>
-                <a:blip r:embed="rId3"/>
-                <a:stretch>
-                  <a:fillRect l="-928" t="-1368"/>
-                </a:stretch>
-              </a:blipFill>
-            </p:spPr>
-            <p:txBody>
-              <a:bodyPr/>
-              <a:lstStyle/>
-              <a:p>
-                <a:r>
-                  <a:rPr lang="en-US">
-                    <a:noFill/>
-                  </a:rPr>
-                  <a:t> </a:t>
-                </a:r>
-              </a:p>
-            </p:txBody>
-          </p:sp>
-        </mc:Fallback>
-      </mc:AlternateContent>
-      <p:sp>
-        <p:nvSpPr>
-          <p:cNvPr id="8" name="TextBox 7"/>
-          <p:cNvSpPr txBox="1"/>
-          <p:nvPr/>
-        </p:nvSpPr>
-        <p:spPr>
-          <a:xfrm>
-            <a:off x="838200" y="1538411"/>
-            <a:ext cx="7809405" cy="830997"/>
-          </a:xfrm>
-          <a:prstGeom prst="rect">
-            <a:avLst/>
-          </a:prstGeom>
-          <a:noFill/>
-        </p:spPr>
-        <p:txBody>
-          <a:bodyPr wrap="square" rtlCol="0">
-            <a:spAutoFit/>
-          </a:bodyPr>
-          <a:lstStyle/>
-          <a:p>
-            <a:r>
-              <a:rPr lang="en-US" sz="2400" dirty="0" smtClean="0"/>
-              <a:t>Remember the general concept of DATA = MODEL + Error.</a:t>
-            </a:r>
-          </a:p>
-          <a:p>
-            <a:r>
-              <a:rPr lang="en-US" sz="2400" dirty="0" smtClean="0"/>
-              <a:t>This can be more elaborately written as:</a:t>
-            </a:r>
-            <a:endParaRPr lang="en-US" sz="2400" dirty="0"/>
-          </a:p>
-        </p:txBody>
-      </p:sp>
-    </p:spTree>
-    <p:extLst>
-      <p:ext uri="{BB962C8B-B14F-4D97-AF65-F5344CB8AC3E}">
-        <p14:creationId xmlns:p14="http://schemas.microsoft.com/office/powerpoint/2010/main" val="1047496979"/>
-      </p:ext>
-    </p:extLst>
-  </p:cSld>
-  <p:clrMapOvr>
-    <a:masterClrMapping/>
-  </p:clrMapOvr>
-</p:sld>
-</file>
-
-<file path=ppt/slides/slide9.xml><?xml version="1.0" encoding="utf-8"?>
-<p:sld xmlns:a="http://schemas.openxmlformats.org/drawingml/2006/main" xmlns:r="http://schemas.openxmlformats.org/officeDocument/2006/relationships" xmlns:p="http://schemas.openxmlformats.org/presentationml/2006/main">
-  <p:cSld>
-    <p:spTree>
-      <p:nvGrpSpPr>
-        <p:cNvPr id="1" name=""/>
-        <p:cNvGrpSpPr/>
-        <p:nvPr/>
-      </p:nvGrpSpPr>
-      <p:grpSpPr>
-        <a:xfrm>
-          <a:off x="0" y="0"/>
-          <a:ext cx="0" cy="0"/>
-          <a:chOff x="0" y="0"/>
-          <a:chExt cx="0" cy="0"/>
-        </a:xfrm>
-      </p:grpSpPr>
-      <p:sp>
-        <p:nvSpPr>
-          <p:cNvPr id="2" name="Title 1"/>
-          <p:cNvSpPr>
-            <a:spLocks noGrp="1"/>
-          </p:cNvSpPr>
-          <p:nvPr>
-            <p:ph type="title"/>
-          </p:nvPr>
-        </p:nvSpPr>
-        <p:spPr>
-          <a:xfrm>
-            <a:off x="670934" y="365125"/>
-            <a:ext cx="11060151" cy="1325563"/>
-          </a:xfrm>
-        </p:spPr>
-        <p:txBody>
-          <a:bodyPr/>
-          <a:lstStyle/>
-          <a:p>
-            <a:r>
-              <a:rPr lang="en-US" dirty="0"/>
-              <a:t>8</a:t>
-            </a:r>
-            <a:r>
-              <a:rPr lang="en-US" dirty="0" smtClean="0"/>
-              <a:t>. How can I actually run my multi-level models?</a:t>
-            </a:r>
-            <a:endParaRPr lang="en-US" dirty="0"/>
-          </a:p>
-        </p:txBody>
-      </p:sp>
-      <p:sp>
-        <p:nvSpPr>
-          <p:cNvPr id="3" name="Content Placeholder 2"/>
-          <p:cNvSpPr>
-            <a:spLocks noGrp="1"/>
-          </p:cNvSpPr>
-          <p:nvPr>
-            <p:ph idx="1"/>
-          </p:nvPr>
-        </p:nvSpPr>
-        <p:spPr>
-          <a:xfrm>
-            <a:off x="838200" y="1502245"/>
-            <a:ext cx="10515600" cy="806063"/>
-          </a:xfrm>
-        </p:spPr>
-        <p:txBody>
-          <a:bodyPr>
-            <a:normAutofit fontScale="77500" lnSpcReduction="20000"/>
-          </a:bodyPr>
-          <a:lstStyle/>
-          <a:p>
-            <a:r>
-              <a:rPr lang="en-US" dirty="0" smtClean="0"/>
-              <a:t>There are numerous texts to help and software packages to do it. They are all slightly different, but users need the same basic understanding of fixed-effects and random-effects to make sure models run correctly. </a:t>
-            </a:r>
-            <a:endParaRPr lang="en-US" dirty="0"/>
-          </a:p>
-        </p:txBody>
-      </p:sp>
-      <p:sp>
-        <p:nvSpPr>
-          <p:cNvPr id="4" name="Slide Number Placeholder 3"/>
-          <p:cNvSpPr>
-            <a:spLocks noGrp="1"/>
-          </p:cNvSpPr>
-          <p:nvPr>
-            <p:ph type="sldNum" sz="quarter" idx="12"/>
-          </p:nvPr>
-        </p:nvSpPr>
-        <p:spPr/>
-        <p:txBody>
-          <a:bodyPr/>
-          <a:lstStyle/>
-          <a:p>
-            <a:fld id="{62D33721-DFD7-43E1-85F9-9FD0AD2C3B28}" type="slidenum">
-              <a:rPr lang="en-US" smtClean="0"/>
-              <a:t>9</a:t>
-            </a:fld>
-            <a:endParaRPr lang="en-US"/>
-          </a:p>
-        </p:txBody>
-      </p:sp>
-      <p:pic>
-        <p:nvPicPr>
-          <p:cNvPr id="5" name="Picture 4" descr="http://ecx.images-amazon.com/images/I/51CtQmIeTQL.jpg"/>
-          <p:cNvPicPr>
-            <a:picLocks noChangeAspect="1" noChangeArrowheads="1"/>
-          </p:cNvPicPr>
-          <p:nvPr/>
-        </p:nvPicPr>
-        <p:blipFill>
-          <a:blip r:embed="rId2">
-            <a:extLst>
-              <a:ext uri="{28A0092B-C50C-407E-A947-70E740481C1C}">
-                <a14:useLocalDpi xmlns:a14="http://schemas.microsoft.com/office/drawing/2010/main" val="0"/>
-              </a:ext>
-            </a:extLst>
-          </a:blip>
-          <a:srcRect/>
-          <a:stretch>
-            <a:fillRect/>
-          </a:stretch>
-        </p:blipFill>
-        <p:spPr bwMode="auto">
-          <a:xfrm>
-            <a:off x="428708" y="2519363"/>
-            <a:ext cx="2743200" cy="3657600"/>
-          </a:xfrm>
-          <a:prstGeom prst="rect">
-            <a:avLst/>
-          </a:prstGeom>
-          <a:noFill/>
-          <a:extLst>
-            <a:ext uri="{909E8E84-426E-40DD-AFC4-6F175D3DCCD1}">
-              <a14:hiddenFill xmlns:a14="http://schemas.microsoft.com/office/drawing/2010/main">
-                <a:solidFill>
-                  <a:srgbClr val="FFFFFF"/>
-                </a:solidFill>
-              </a14:hiddenFill>
-            </a:ext>
-          </a:extLst>
-        </p:spPr>
-      </p:pic>
-      <p:pic>
-        <p:nvPicPr>
-          <p:cNvPr id="6" name="Picture 6" descr="http://ecx.images-amazon.com/images/I/814UviSFLYL.jpg"/>
-          <p:cNvPicPr>
-            <a:picLocks noChangeAspect="1" noChangeArrowheads="1"/>
-          </p:cNvPicPr>
-          <p:nvPr/>
-        </p:nvPicPr>
-        <p:blipFill>
-          <a:blip r:embed="rId3" cstate="print">
-            <a:extLst>
-              <a:ext uri="{28A0092B-C50C-407E-A947-70E740481C1C}">
-                <a14:useLocalDpi xmlns:a14="http://schemas.microsoft.com/office/drawing/2010/main" val="0"/>
-              </a:ext>
-            </a:extLst>
-          </a:blip>
-          <a:srcRect/>
-          <a:stretch>
-            <a:fillRect/>
-          </a:stretch>
-        </p:blipFill>
-        <p:spPr bwMode="auto">
-          <a:xfrm>
-            <a:off x="3761277" y="2519363"/>
-            <a:ext cx="2474507" cy="3657600"/>
-          </a:xfrm>
-          <a:prstGeom prst="rect">
-            <a:avLst/>
-          </a:prstGeom>
-          <a:noFill/>
-          <a:extLst>
-            <a:ext uri="{909E8E84-426E-40DD-AFC4-6F175D3DCCD1}">
-              <a14:hiddenFill xmlns:a14="http://schemas.microsoft.com/office/drawing/2010/main">
-                <a:solidFill>
-                  <a:srgbClr val="FFFFFF"/>
-                </a:solidFill>
-              </a14:hiddenFill>
-            </a:ext>
-          </a:extLst>
-        </p:spPr>
-      </p:pic>
-      <p:sp>
-        <p:nvSpPr>
-          <p:cNvPr id="7" name="TextBox 6"/>
-          <p:cNvSpPr txBox="1"/>
-          <p:nvPr/>
-        </p:nvSpPr>
-        <p:spPr>
-          <a:xfrm>
-            <a:off x="428708" y="6176963"/>
-            <a:ext cx="6075766" cy="369332"/>
-          </a:xfrm>
-          <a:prstGeom prst="rect">
-            <a:avLst/>
-          </a:prstGeom>
-          <a:noFill/>
-        </p:spPr>
-        <p:txBody>
-          <a:bodyPr wrap="none" rtlCol="0">
-            <a:spAutoFit/>
-          </a:bodyPr>
-          <a:lstStyle/>
-          <a:p>
-            <a:r>
-              <a:rPr lang="en-US" dirty="0" smtClean="0"/>
-              <a:t>Most of what I will say has been said better in these resources!</a:t>
-            </a:r>
-            <a:endParaRPr lang="en-US" dirty="0"/>
-          </a:p>
-        </p:txBody>
-      </p:sp>
-      <p:grpSp>
-        <p:nvGrpSpPr>
-          <p:cNvPr id="12" name="Group 11"/>
-          <p:cNvGrpSpPr/>
-          <p:nvPr/>
-        </p:nvGrpSpPr>
-        <p:grpSpPr>
-          <a:xfrm>
-            <a:off x="9406592" y="2531329"/>
-            <a:ext cx="2286000" cy="2857043"/>
-            <a:chOff x="8440097" y="3703822"/>
-            <a:chExt cx="2433660" cy="2857043"/>
-          </a:xfrm>
-        </p:grpSpPr>
-        <p:pic>
-          <p:nvPicPr>
-            <p:cNvPr id="13" name="Picture 10" descr="http://www.uni-giessen.de/cms/fbz/svc/hrz/svc/software/lizenzen/spss/SPSS_IBM_logo.png"/>
-            <p:cNvPicPr>
-              <a:picLocks noChangeAspect="1" noChangeArrowheads="1"/>
-            </p:cNvPicPr>
-            <p:nvPr/>
-          </p:nvPicPr>
-          <p:blipFill>
-            <a:blip r:embed="rId4">
-              <a:extLst>
-                <a:ext uri="{28A0092B-C50C-407E-A947-70E740481C1C}">
-                  <a14:useLocalDpi xmlns:a14="http://schemas.microsoft.com/office/drawing/2010/main" val="0"/>
-                </a:ext>
-              </a:extLst>
-            </a:blip>
-            <a:srcRect/>
-            <a:stretch>
-              <a:fillRect/>
-            </a:stretch>
-          </p:blipFill>
-          <p:spPr bwMode="auto">
-            <a:xfrm>
-              <a:off x="8440098" y="4073154"/>
-              <a:ext cx="2433659" cy="1093669"/>
-            </a:xfrm>
-            <a:prstGeom prst="rect">
-              <a:avLst/>
-            </a:prstGeom>
-            <a:noFill/>
-            <a:extLst>
-              <a:ext uri="{909E8E84-426E-40DD-AFC4-6F175D3DCCD1}">
-                <a14:hiddenFill xmlns:a14="http://schemas.microsoft.com/office/drawing/2010/main">
-                  <a:solidFill>
-                    <a:srgbClr val="FFFFFF"/>
-                  </a:solidFill>
-                </a14:hiddenFill>
-              </a:ext>
-            </a:extLst>
-          </p:spPr>
-        </p:pic>
-        <p:pic>
-          <p:nvPicPr>
-            <p:cNvPr id="14" name="Picture 14" descr="http://uwm.edu/software/wp-content/uploads/sites/76/2014/04/sas-logo.jpg"/>
-            <p:cNvPicPr>
-              <a:picLocks noChangeAspect="1" noChangeArrowheads="1"/>
-            </p:cNvPicPr>
-            <p:nvPr/>
-          </p:nvPicPr>
-          <p:blipFill rotWithShape="1">
-            <a:blip r:embed="rId5">
-              <a:extLst>
-                <a:ext uri="{28A0092B-C50C-407E-A947-70E740481C1C}">
-                  <a14:useLocalDpi xmlns:a14="http://schemas.microsoft.com/office/drawing/2010/main" val="0"/>
-                </a:ext>
-              </a:extLst>
-            </a:blip>
-            <a:srcRect l="15810" t="8892" r="16580" b="14163"/>
-            <a:stretch/>
-          </p:blipFill>
-          <p:spPr bwMode="auto">
-            <a:xfrm>
-              <a:off x="8440098" y="5327243"/>
-              <a:ext cx="2157190" cy="1233622"/>
-            </a:xfrm>
-            <a:prstGeom prst="rect">
-              <a:avLst/>
-            </a:prstGeom>
-            <a:noFill/>
-            <a:extLst>
-              <a:ext uri="{909E8E84-426E-40DD-AFC4-6F175D3DCCD1}">
-                <a14:hiddenFill xmlns:a14="http://schemas.microsoft.com/office/drawing/2010/main">
-                  <a:solidFill>
-                    <a:srgbClr val="FFFFFF"/>
-                  </a:solidFill>
-                </a14:hiddenFill>
-              </a:ext>
-            </a:extLst>
-          </p:spPr>
-        </p:pic>
-        <p:sp>
-          <p:nvSpPr>
-            <p:cNvPr id="15" name="TextBox 14"/>
-            <p:cNvSpPr txBox="1"/>
-            <p:nvPr/>
-          </p:nvSpPr>
-          <p:spPr>
-            <a:xfrm>
-              <a:off x="8440097" y="3703822"/>
-              <a:ext cx="2199448" cy="369332"/>
-            </a:xfrm>
-            <a:prstGeom prst="rect">
-              <a:avLst/>
-            </a:prstGeom>
-            <a:noFill/>
-          </p:spPr>
-          <p:txBody>
-            <a:bodyPr wrap="none" rtlCol="0">
-              <a:spAutoFit/>
-            </a:bodyPr>
-            <a:lstStyle/>
-            <a:p>
-              <a:r>
-                <a:rPr lang="en-US" b="1" i="1" u="sng" dirty="0" smtClean="0"/>
-                <a:t>But you can also use:</a:t>
-              </a:r>
-              <a:endParaRPr lang="en-US" b="1" i="1" u="sng" dirty="0"/>
-            </a:p>
-          </p:txBody>
-        </p:sp>
-      </p:grpSp>
-      <p:pic>
-        <p:nvPicPr>
-          <p:cNvPr id="16" name="Picture 15"/>
-          <p:cNvPicPr>
-            <a:picLocks noChangeAspect="1"/>
-          </p:cNvPicPr>
-          <p:nvPr/>
-        </p:nvPicPr>
-        <p:blipFill>
-          <a:blip r:embed="rId6"/>
-          <a:stretch>
-            <a:fillRect/>
-          </a:stretch>
-        </p:blipFill>
-        <p:spPr>
-          <a:xfrm>
-            <a:off x="6437564" y="2525290"/>
-            <a:ext cx="2743200" cy="1910741"/>
-          </a:xfrm>
-          <a:prstGeom prst="rect">
-            <a:avLst/>
-          </a:prstGeom>
-        </p:spPr>
-      </p:pic>
-      <p:pic>
-        <p:nvPicPr>
-          <p:cNvPr id="1026" name="Picture 2" descr="http://www.ssicentral.com/hlm/HLM7CD.jpg"/>
-          <p:cNvPicPr>
-            <a:picLocks noChangeAspect="1" noChangeArrowheads="1"/>
-          </p:cNvPicPr>
-          <p:nvPr/>
-        </p:nvPicPr>
-        <p:blipFill rotWithShape="1">
-          <a:blip r:embed="rId7" cstate="print">
-            <a:extLst>
-              <a:ext uri="{28A0092B-C50C-407E-A947-70E740481C1C}">
-                <a14:useLocalDpi xmlns:a14="http://schemas.microsoft.com/office/drawing/2010/main" val="0"/>
-              </a:ext>
-            </a:extLst>
-          </a:blip>
-          <a:srcRect t="7371" b="35712"/>
-          <a:stretch/>
-        </p:blipFill>
-        <p:spPr bwMode="auto">
-          <a:xfrm>
-            <a:off x="9406592" y="5455991"/>
-            <a:ext cx="2286000" cy="1173563"/>
-          </a:xfrm>
-          <a:prstGeom prst="rect">
-            <a:avLst/>
-          </a:prstGeom>
-          <a:noFill/>
-          <a:extLst>
-            <a:ext uri="{909E8E84-426E-40DD-AFC4-6F175D3DCCD1}">
-              <a14:hiddenFill xmlns:a14="http://schemas.microsoft.com/office/drawing/2010/main">
-                <a:solidFill>
-                  <a:srgbClr val="FFFFFF"/>
-                </a:solidFill>
-              </a14:hiddenFill>
-            </a:ext>
-          </a:extLst>
-        </p:spPr>
-      </p:pic>
-    </p:spTree>
-    <p:extLst>
-      <p:ext uri="{BB962C8B-B14F-4D97-AF65-F5344CB8AC3E}">
-        <p14:creationId xmlns:p14="http://schemas.microsoft.com/office/powerpoint/2010/main" val="1373274935"/>
       </p:ext>
     </p:extLst>
   </p:cSld>

</xml_diff>

<commit_message>
further revisions to workshop
Fixing minor typos and updating institutional affiliations in workshop materials.
</commit_message>
<xml_diff>
--- a/lohse ACRM 2017 tips.pptx
+++ b/lohse ACRM 2017 tips.pptx
@@ -3458,7 +3458,7 @@
                   </a:schemeClr>
                 </a:solidFill>
               </a:rPr>
-              <a:t>rehabinformatics@gmail.com</a:t>
+              <a:t>University of Utah</a:t>
             </a:r>
             <a:endParaRPr lang="en-US" sz="1800" dirty="0" smtClean="0">
               <a:solidFill>
@@ -3467,6 +3467,18 @@
                 </a:schemeClr>
               </a:solidFill>
             </a:endParaRPr>
+          </a:p>
+          <a:p>
+            <a:r>
+              <a:rPr lang="en-US" sz="1800" dirty="0" smtClean="0">
+                <a:solidFill>
+                  <a:schemeClr val="bg1">
+                    <a:lumMod val="50000"/>
+                  </a:schemeClr>
+                </a:solidFill>
+              </a:rPr>
+              <a:t>rehabinformatics@gmail.com</a:t>
+            </a:r>
           </a:p>
         </p:txBody>
       </p:sp>
@@ -3864,13 +3876,6 @@
               </a:rPr>
               <a:t>allan.kozlowski@maryfreebed.com</a:t>
             </a:r>
-            <a:endParaRPr lang="en-US" sz="1900" dirty="0" smtClean="0">
-              <a:solidFill>
-                <a:schemeClr val="bg1">
-                  <a:lumMod val="50000"/>
-                </a:schemeClr>
-              </a:solidFill>
-            </a:endParaRPr>
           </a:p>
         </p:txBody>
       </p:sp>

</xml_diff>